<commit_message>
Added lesson 5 template, updated lesson 4 pptx
</commit_message>
<xml_diff>
--- a/PowerPoints/Lesson 4-Objects and Subsystems.pptx
+++ b/PowerPoints/Lesson 4-Objects and Subsystems.pptx
@@ -129,1771 +129,6 @@
 </p:presentation>
 </file>
 
-<file path=ppt/changesInfos/changesInfo1.xml><?xml version="1.0" encoding="utf-8"?>
-<pc:chgInfo xmlns:a="http://schemas.openxmlformats.org/drawingml/2006/main" xmlns:r="http://schemas.openxmlformats.org/officeDocument/2006/relationships" xmlns:ac="http://schemas.microsoft.com/office/drawing/2013/main/command" xmlns:pc="http://schemas.microsoft.com/office/powerpoint/2013/main/command">
-  <pc:docChgLst>
-    <pc:chgData name="Sequeria, G" userId="S::g.sequeria@chca-oh.org::354cc9a8-f617-402c-a718-3bbac0249127" providerId="AD" clId="Web-{F09C4EEA-538E-9AE0-8F8A-1C26C96AAFF6}"/>
-    <pc:docChg chg="modSld sldOrd">
-      <pc:chgData name="Sequeria, G" userId="S::g.sequeria@chca-oh.org::354cc9a8-f617-402c-a718-3bbac0249127" providerId="AD" clId="Web-{F09C4EEA-538E-9AE0-8F8A-1C26C96AAFF6}" dt="2024-09-28T15:17:13.193" v="9" actId="1076"/>
-      <pc:docMkLst>
-        <pc:docMk/>
-      </pc:docMkLst>
-      <pc:sldChg chg="ord">
-        <pc:chgData name="Sequeria, G" userId="S::g.sequeria@chca-oh.org::354cc9a8-f617-402c-a718-3bbac0249127" providerId="AD" clId="Web-{F09C4EEA-538E-9AE0-8F8A-1C26C96AAFF6}" dt="2024-09-28T15:12:27.052" v="4"/>
-        <pc:sldMkLst>
-          <pc:docMk/>
-          <pc:sldMk cId="272849991" sldId="261"/>
-        </pc:sldMkLst>
-      </pc:sldChg>
-      <pc:sldChg chg="modSp ord">
-        <pc:chgData name="Sequeria, G" userId="S::g.sequeria@chca-oh.org::354cc9a8-f617-402c-a718-3bbac0249127" providerId="AD" clId="Web-{F09C4EEA-538E-9AE0-8F8A-1C26C96AAFF6}" dt="2024-09-28T15:12:31.364" v="5"/>
-        <pc:sldMkLst>
-          <pc:docMk/>
-          <pc:sldMk cId="3828729462" sldId="263"/>
-        </pc:sldMkLst>
-        <pc:spChg chg="mod">
-          <ac:chgData name="Sequeria, G" userId="S::g.sequeria@chca-oh.org::354cc9a8-f617-402c-a718-3bbac0249127" providerId="AD" clId="Web-{F09C4EEA-538E-9AE0-8F8A-1C26C96AAFF6}" dt="2024-09-28T15:10:57.005" v="3" actId="20577"/>
-          <ac:spMkLst>
-            <pc:docMk/>
-            <pc:sldMk cId="3828729462" sldId="263"/>
-            <ac:spMk id="3" creationId="{3D41FC7A-ACAB-DB82-6F78-A80EBF91E49E}"/>
-          </ac:spMkLst>
-        </pc:spChg>
-      </pc:sldChg>
-      <pc:sldChg chg="ord">
-        <pc:chgData name="Sequeria, G" userId="S::g.sequeria@chca-oh.org::354cc9a8-f617-402c-a718-3bbac0249127" providerId="AD" clId="Web-{F09C4EEA-538E-9AE0-8F8A-1C26C96AAFF6}" dt="2024-09-28T15:12:33.583" v="6"/>
-        <pc:sldMkLst>
-          <pc:docMk/>
-          <pc:sldMk cId="2105718600" sldId="264"/>
-        </pc:sldMkLst>
-      </pc:sldChg>
-      <pc:sldChg chg="modSp">
-        <pc:chgData name="Sequeria, G" userId="S::g.sequeria@chca-oh.org::354cc9a8-f617-402c-a718-3bbac0249127" providerId="AD" clId="Web-{F09C4EEA-538E-9AE0-8F8A-1C26C96AAFF6}" dt="2024-09-28T15:17:13.193" v="9" actId="1076"/>
-        <pc:sldMkLst>
-          <pc:docMk/>
-          <pc:sldMk cId="588260971" sldId="268"/>
-        </pc:sldMkLst>
-        <pc:picChg chg="mod modCrop">
-          <ac:chgData name="Sequeria, G" userId="S::g.sequeria@chca-oh.org::354cc9a8-f617-402c-a718-3bbac0249127" providerId="AD" clId="Web-{F09C4EEA-538E-9AE0-8F8A-1C26C96AAFF6}" dt="2024-09-28T15:17:13.193" v="9" actId="1076"/>
-          <ac:picMkLst>
-            <pc:docMk/>
-            <pc:sldMk cId="588260971" sldId="268"/>
-            <ac:picMk id="9" creationId="{59AF54EC-BCFE-1BC4-164C-4090DD5E18A0}"/>
-          </ac:picMkLst>
-        </pc:picChg>
-      </pc:sldChg>
-    </pc:docChg>
-  </pc:docChgLst>
-  <pc:docChgLst>
-    <pc:chgData name="Sequeria, G" userId="354cc9a8-f617-402c-a718-3bbac0249127" providerId="ADAL" clId="{7FD6E24F-59FD-474F-98B0-4F1D0B2A2745}"/>
-    <pc:docChg chg="custSel modSld">
-      <pc:chgData name="Sequeria, G" userId="354cc9a8-f617-402c-a718-3bbac0249127" providerId="ADAL" clId="{7FD6E24F-59FD-474F-98B0-4F1D0B2A2745}" dt="2024-10-05T15:16:04.923" v="170" actId="1076"/>
-      <pc:docMkLst>
-        <pc:docMk/>
-      </pc:docMkLst>
-      <pc:sldChg chg="addSp delSp modSp mod">
-        <pc:chgData name="Sequeria, G" userId="354cc9a8-f617-402c-a718-3bbac0249127" providerId="ADAL" clId="{7FD6E24F-59FD-474F-98B0-4F1D0B2A2745}" dt="2024-10-05T14:48:33.124" v="37" actId="1076"/>
-        <pc:sldMkLst>
-          <pc:docMk/>
-          <pc:sldMk cId="4147665023" sldId="267"/>
-        </pc:sldMkLst>
-        <pc:spChg chg="mod">
-          <ac:chgData name="Sequeria, G" userId="354cc9a8-f617-402c-a718-3bbac0249127" providerId="ADAL" clId="{7FD6E24F-59FD-474F-98B0-4F1D0B2A2745}" dt="2024-10-05T14:48:03.656" v="34" actId="20577"/>
-          <ac:spMkLst>
-            <pc:docMk/>
-            <pc:sldMk cId="4147665023" sldId="267"/>
-            <ac:spMk id="3" creationId="{128B73CD-8CED-B85E-A0C1-674C445E502B}"/>
-          </ac:spMkLst>
-        </pc:spChg>
-        <pc:picChg chg="del">
-          <ac:chgData name="Sequeria, G" userId="354cc9a8-f617-402c-a718-3bbac0249127" providerId="ADAL" clId="{7FD6E24F-59FD-474F-98B0-4F1D0B2A2745}" dt="2024-10-05T14:47:28.361" v="3" actId="478"/>
-          <ac:picMkLst>
-            <pc:docMk/>
-            <pc:sldMk cId="4147665023" sldId="267"/>
-            <ac:picMk id="5" creationId="{8461B9CC-AFDA-538E-8EED-CE1FD64C8513}"/>
-          </ac:picMkLst>
-        </pc:picChg>
-        <pc:picChg chg="add del mod">
-          <ac:chgData name="Sequeria, G" userId="354cc9a8-f617-402c-a718-3bbac0249127" providerId="ADAL" clId="{7FD6E24F-59FD-474F-98B0-4F1D0B2A2745}" dt="2024-10-05T14:48:29.070" v="35" actId="478"/>
-          <ac:picMkLst>
-            <pc:docMk/>
-            <pc:sldMk cId="4147665023" sldId="267"/>
-            <ac:picMk id="6" creationId="{7B874ABA-660C-2C39-E524-95D7515CB743}"/>
-          </ac:picMkLst>
-        </pc:picChg>
-        <pc:picChg chg="add mod">
-          <ac:chgData name="Sequeria, G" userId="354cc9a8-f617-402c-a718-3bbac0249127" providerId="ADAL" clId="{7FD6E24F-59FD-474F-98B0-4F1D0B2A2745}" dt="2024-10-05T14:48:33.124" v="37" actId="1076"/>
-          <ac:picMkLst>
-            <pc:docMk/>
-            <pc:sldMk cId="4147665023" sldId="267"/>
-            <ac:picMk id="8" creationId="{A195830D-4E3D-A9C4-8A5B-0DDB0DFE1952}"/>
-          </ac:picMkLst>
-        </pc:picChg>
-      </pc:sldChg>
-      <pc:sldChg chg="addSp delSp modSp mod">
-        <pc:chgData name="Sequeria, G" userId="354cc9a8-f617-402c-a718-3bbac0249127" providerId="ADAL" clId="{7FD6E24F-59FD-474F-98B0-4F1D0B2A2745}" dt="2024-10-05T14:56:55.412" v="40" actId="1076"/>
-        <pc:sldMkLst>
-          <pc:docMk/>
-          <pc:sldMk cId="588260971" sldId="268"/>
-        </pc:sldMkLst>
-        <pc:picChg chg="add mod">
-          <ac:chgData name="Sequeria, G" userId="354cc9a8-f617-402c-a718-3bbac0249127" providerId="ADAL" clId="{7FD6E24F-59FD-474F-98B0-4F1D0B2A2745}" dt="2024-10-05T14:56:55.412" v="40" actId="1076"/>
-          <ac:picMkLst>
-            <pc:docMk/>
-            <pc:sldMk cId="588260971" sldId="268"/>
-            <ac:picMk id="5" creationId="{D5A1F8EC-4583-73FC-F466-2896D3A06769}"/>
-          </ac:picMkLst>
-        </pc:picChg>
-        <pc:picChg chg="del">
-          <ac:chgData name="Sequeria, G" userId="354cc9a8-f617-402c-a718-3bbac0249127" providerId="ADAL" clId="{7FD6E24F-59FD-474F-98B0-4F1D0B2A2745}" dt="2024-10-05T14:56:50.142" v="38" actId="478"/>
-          <ac:picMkLst>
-            <pc:docMk/>
-            <pc:sldMk cId="588260971" sldId="268"/>
-            <ac:picMk id="9" creationId="{59AF54EC-BCFE-1BC4-164C-4090DD5E18A0}"/>
-          </ac:picMkLst>
-        </pc:picChg>
-      </pc:sldChg>
-      <pc:sldChg chg="addSp delSp modSp mod">
-        <pc:chgData name="Sequeria, G" userId="354cc9a8-f617-402c-a718-3bbac0249127" providerId="ADAL" clId="{7FD6E24F-59FD-474F-98B0-4F1D0B2A2745}" dt="2024-10-05T15:01:22.989" v="56" actId="20577"/>
-        <pc:sldMkLst>
-          <pc:docMk/>
-          <pc:sldMk cId="955722205" sldId="269"/>
-        </pc:sldMkLst>
-        <pc:spChg chg="mod">
-          <ac:chgData name="Sequeria, G" userId="354cc9a8-f617-402c-a718-3bbac0249127" providerId="ADAL" clId="{7FD6E24F-59FD-474F-98B0-4F1D0B2A2745}" dt="2024-10-05T15:01:22.989" v="56" actId="20577"/>
-          <ac:spMkLst>
-            <pc:docMk/>
-            <pc:sldMk cId="955722205" sldId="269"/>
-            <ac:spMk id="3" creationId="{4AE429D5-CAF1-6B16-A071-33562D3C50DC}"/>
-          </ac:spMkLst>
-        </pc:spChg>
-        <pc:picChg chg="add mod">
-          <ac:chgData name="Sequeria, G" userId="354cc9a8-f617-402c-a718-3bbac0249127" providerId="ADAL" clId="{7FD6E24F-59FD-474F-98B0-4F1D0B2A2745}" dt="2024-10-05T15:01:11.965" v="46" actId="1076"/>
-          <ac:picMkLst>
-            <pc:docMk/>
-            <pc:sldMk cId="955722205" sldId="269"/>
-            <ac:picMk id="5" creationId="{A9A3065F-FB96-0244-02F7-08B8586EBE95}"/>
-          </ac:picMkLst>
-        </pc:picChg>
-        <pc:picChg chg="del">
-          <ac:chgData name="Sequeria, G" userId="354cc9a8-f617-402c-a718-3bbac0249127" providerId="ADAL" clId="{7FD6E24F-59FD-474F-98B0-4F1D0B2A2745}" dt="2024-10-05T15:00:52.704" v="41" actId="478"/>
-          <ac:picMkLst>
-            <pc:docMk/>
-            <pc:sldMk cId="955722205" sldId="269"/>
-            <ac:picMk id="7" creationId="{9E74EFDC-E356-7C3E-9124-9B2BF08BEDE6}"/>
-          </ac:picMkLst>
-        </pc:picChg>
-      </pc:sldChg>
-      <pc:sldChg chg="addSp delSp modSp mod">
-        <pc:chgData name="Sequeria, G" userId="354cc9a8-f617-402c-a718-3bbac0249127" providerId="ADAL" clId="{7FD6E24F-59FD-474F-98B0-4F1D0B2A2745}" dt="2024-10-05T15:09:13.333" v="158" actId="1076"/>
-        <pc:sldMkLst>
-          <pc:docMk/>
-          <pc:sldMk cId="2244053879" sldId="270"/>
-        </pc:sldMkLst>
-        <pc:picChg chg="add del mod">
-          <ac:chgData name="Sequeria, G" userId="354cc9a8-f617-402c-a718-3bbac0249127" providerId="ADAL" clId="{7FD6E24F-59FD-474F-98B0-4F1D0B2A2745}" dt="2024-10-05T15:09:08.627" v="156" actId="478"/>
-          <ac:picMkLst>
-            <pc:docMk/>
-            <pc:sldMk cId="2244053879" sldId="270"/>
-            <ac:picMk id="4" creationId="{F4103161-EDE2-3249-1177-2269AE7D2BE3}"/>
-          </ac:picMkLst>
-        </pc:picChg>
-        <pc:picChg chg="add mod">
-          <ac:chgData name="Sequeria, G" userId="354cc9a8-f617-402c-a718-3bbac0249127" providerId="ADAL" clId="{7FD6E24F-59FD-474F-98B0-4F1D0B2A2745}" dt="2024-10-05T15:09:13.333" v="158" actId="1076"/>
-          <ac:picMkLst>
-            <pc:docMk/>
-            <pc:sldMk cId="2244053879" sldId="270"/>
-            <ac:picMk id="6" creationId="{FE489900-2514-1AC9-5E8E-7CFE3264FDC5}"/>
-          </ac:picMkLst>
-        </pc:picChg>
-        <pc:picChg chg="del">
-          <ac:chgData name="Sequeria, G" userId="354cc9a8-f617-402c-a718-3bbac0249127" providerId="ADAL" clId="{7FD6E24F-59FD-474F-98B0-4F1D0B2A2745}" dt="2024-10-05T15:08:01.842" v="152" actId="478"/>
-          <ac:picMkLst>
-            <pc:docMk/>
-            <pc:sldMk cId="2244053879" sldId="270"/>
-            <ac:picMk id="9" creationId="{66539927-C5D5-BE1C-8C67-05BE71DA36C0}"/>
-          </ac:picMkLst>
-        </pc:picChg>
-      </pc:sldChg>
-      <pc:sldChg chg="addSp delSp modSp mod">
-        <pc:chgData name="Sequeria, G" userId="354cc9a8-f617-402c-a718-3bbac0249127" providerId="ADAL" clId="{7FD6E24F-59FD-474F-98B0-4F1D0B2A2745}" dt="2024-10-05T15:16:04.923" v="170" actId="1076"/>
-        <pc:sldMkLst>
-          <pc:docMk/>
-          <pc:sldMk cId="357538730" sldId="271"/>
-        </pc:sldMkLst>
-        <pc:spChg chg="mod">
-          <ac:chgData name="Sequeria, G" userId="354cc9a8-f617-402c-a718-3bbac0249127" providerId="ADAL" clId="{7FD6E24F-59FD-474F-98B0-4F1D0B2A2745}" dt="2024-10-05T15:15:43.733" v="164" actId="27636"/>
-          <ac:spMkLst>
-            <pc:docMk/>
-            <pc:sldMk cId="357538730" sldId="271"/>
-            <ac:spMk id="2" creationId="{6FDADF95-821D-82B7-F9B0-D47A4DD659DF}"/>
-          </ac:spMkLst>
-        </pc:spChg>
-        <pc:spChg chg="mod">
-          <ac:chgData name="Sequeria, G" userId="354cc9a8-f617-402c-a718-3bbac0249127" providerId="ADAL" clId="{7FD6E24F-59FD-474F-98B0-4F1D0B2A2745}" dt="2024-10-05T15:15:49.605" v="165" actId="14100"/>
-          <ac:spMkLst>
-            <pc:docMk/>
-            <pc:sldMk cId="357538730" sldId="271"/>
-            <ac:spMk id="3" creationId="{D9074FBE-14D5-B9A8-7726-82E643B99D6F}"/>
-          </ac:spMkLst>
-        </pc:spChg>
-        <pc:picChg chg="del">
-          <ac:chgData name="Sequeria, G" userId="354cc9a8-f617-402c-a718-3bbac0249127" providerId="ADAL" clId="{7FD6E24F-59FD-474F-98B0-4F1D0B2A2745}" dt="2024-10-05T15:13:51.402" v="159" actId="478"/>
-          <ac:picMkLst>
-            <pc:docMk/>
-            <pc:sldMk cId="357538730" sldId="271"/>
-            <ac:picMk id="5" creationId="{59EE89D3-A5D7-923C-3B09-FE4E5C414755}"/>
-          </ac:picMkLst>
-        </pc:picChg>
-        <pc:picChg chg="add del mod">
-          <ac:chgData name="Sequeria, G" userId="354cc9a8-f617-402c-a718-3bbac0249127" providerId="ADAL" clId="{7FD6E24F-59FD-474F-98B0-4F1D0B2A2745}" dt="2024-10-05T15:14:03.724" v="162" actId="478"/>
-          <ac:picMkLst>
-            <pc:docMk/>
-            <pc:sldMk cId="357538730" sldId="271"/>
-            <ac:picMk id="6" creationId="{482DB48E-49E3-1DEA-CBA2-FC104006036D}"/>
-          </ac:picMkLst>
-        </pc:picChg>
-        <pc:picChg chg="add mod">
-          <ac:chgData name="Sequeria, G" userId="354cc9a8-f617-402c-a718-3bbac0249127" providerId="ADAL" clId="{7FD6E24F-59FD-474F-98B0-4F1D0B2A2745}" dt="2024-10-05T15:16:04.923" v="170" actId="1076"/>
-          <ac:picMkLst>
-            <pc:docMk/>
-            <pc:sldMk cId="357538730" sldId="271"/>
-            <ac:picMk id="8" creationId="{B06FC257-0605-0055-9E1C-FCCA9602FDFE}"/>
-          </ac:picMkLst>
-        </pc:picChg>
-      </pc:sldChg>
-      <pc:sldChg chg="modSp mod">
-        <pc:chgData name="Sequeria, G" userId="354cc9a8-f617-402c-a718-3bbac0249127" providerId="ADAL" clId="{7FD6E24F-59FD-474F-98B0-4F1D0B2A2745}" dt="2024-10-05T15:03:16.577" v="151" actId="20577"/>
-        <pc:sldMkLst>
-          <pc:docMk/>
-          <pc:sldMk cId="3105824425" sldId="272"/>
-        </pc:sldMkLst>
-        <pc:spChg chg="mod">
-          <ac:chgData name="Sequeria, G" userId="354cc9a8-f617-402c-a718-3bbac0249127" providerId="ADAL" clId="{7FD6E24F-59FD-474F-98B0-4F1D0B2A2745}" dt="2024-10-05T15:03:16.577" v="151" actId="20577"/>
-          <ac:spMkLst>
-            <pc:docMk/>
-            <pc:sldMk cId="3105824425" sldId="272"/>
-            <ac:spMk id="3" creationId="{BA6B51E8-A762-EAF4-7868-C5A49F727F76}"/>
-          </ac:spMkLst>
-        </pc:spChg>
-      </pc:sldChg>
-    </pc:docChg>
-  </pc:docChgLst>
-  <pc:docChgLst>
-    <pc:chgData name="Guest User" userId="S::urn:spo:anon#970bc72fef1285d03cff5ea2398e6a07664c7f7352456fb45ade4e84ec1c7961::" providerId="AD" clId="Web-{2F29692F-35E4-4803-2B2C-2EECE8B945C3}"/>
-    <pc:docChg chg="modSld">
-      <pc:chgData name="Guest User" userId="S::urn:spo:anon#970bc72fef1285d03cff5ea2398e6a07664c7f7352456fb45ade4e84ec1c7961::" providerId="AD" clId="Web-{2F29692F-35E4-4803-2B2C-2EECE8B945C3}" dt="2024-09-28T15:03:28.471" v="2" actId="1076"/>
-      <pc:docMkLst>
-        <pc:docMk/>
-      </pc:docMkLst>
-      <pc:sldChg chg="modSp">
-        <pc:chgData name="Guest User" userId="S::urn:spo:anon#970bc72fef1285d03cff5ea2398e6a07664c7f7352456fb45ade4e84ec1c7961::" providerId="AD" clId="Web-{2F29692F-35E4-4803-2B2C-2EECE8B945C3}" dt="2024-09-28T15:03:28.471" v="2" actId="1076"/>
-        <pc:sldMkLst>
-          <pc:docMk/>
-          <pc:sldMk cId="1040266725" sldId="259"/>
-        </pc:sldMkLst>
-        <pc:spChg chg="mod">
-          <ac:chgData name="Guest User" userId="S::urn:spo:anon#970bc72fef1285d03cff5ea2398e6a07664c7f7352456fb45ade4e84ec1c7961::" providerId="AD" clId="Web-{2F29692F-35E4-4803-2B2C-2EECE8B945C3}" dt="2024-09-28T15:03:11.034" v="1" actId="1076"/>
-          <ac:spMkLst>
-            <pc:docMk/>
-            <pc:sldMk cId="1040266725" sldId="259"/>
-            <ac:spMk id="3" creationId="{31F27C62-B3F4-BEF6-1D42-572841FB047F}"/>
-          </ac:spMkLst>
-        </pc:spChg>
-        <pc:spChg chg="mod">
-          <ac:chgData name="Guest User" userId="S::urn:spo:anon#970bc72fef1285d03cff5ea2398e6a07664c7f7352456fb45ade4e84ec1c7961::" providerId="AD" clId="Web-{2F29692F-35E4-4803-2B2C-2EECE8B945C3}" dt="2024-09-28T15:03:28.471" v="2" actId="1076"/>
-          <ac:spMkLst>
-            <pc:docMk/>
-            <pc:sldMk cId="1040266725" sldId="259"/>
-            <ac:spMk id="6" creationId="{D6F27F19-7C51-C810-09BC-23456CEB8C70}"/>
-          </ac:spMkLst>
-        </pc:spChg>
-      </pc:sldChg>
-    </pc:docChg>
-  </pc:docChgLst>
-  <pc:docChgLst>
-    <pc:chgData name="Sequeria, G" userId="S::g.sequeria@chca-oh.org::354cc9a8-f617-402c-a718-3bbac0249127" providerId="AD" clId="Web-{0764262F-8F9A-7A8A-6088-8DDE935EEC31}"/>
-    <pc:docChg chg="modSld">
-      <pc:chgData name="Sequeria, G" userId="S::g.sequeria@chca-oh.org::354cc9a8-f617-402c-a718-3bbac0249127" providerId="AD" clId="Web-{0764262F-8F9A-7A8A-6088-8DDE935EEC31}" dt="2024-09-28T15:25:04.233" v="48"/>
-      <pc:docMkLst>
-        <pc:docMk/>
-      </pc:docMkLst>
-      <pc:sldChg chg="modNotes">
-        <pc:chgData name="Sequeria, G" userId="S::g.sequeria@chca-oh.org::354cc9a8-f617-402c-a718-3bbac0249127" providerId="AD" clId="Web-{0764262F-8F9A-7A8A-6088-8DDE935EEC31}" dt="2024-09-28T15:25:04.233" v="48"/>
-        <pc:sldMkLst>
-          <pc:docMk/>
-          <pc:sldMk cId="357538730" sldId="271"/>
-        </pc:sldMkLst>
-      </pc:sldChg>
-    </pc:docChg>
-  </pc:docChgLst>
-  <pc:docChgLst>
-    <pc:chgData name="Guest User" userId="S::urn:spo:anon#970bc72fef1285d03cff5ea2398e6a07664c7f7352456fb45ade4e84ec1c7961::" providerId="AD" clId="Web-{BC29DA4E-B969-81DD-8626-B9C0117958E7}"/>
-    <pc:docChg chg="modSld">
-      <pc:chgData name="Guest User" userId="S::urn:spo:anon#970bc72fef1285d03cff5ea2398e6a07664c7f7352456fb45ade4e84ec1c7961::" providerId="AD" clId="Web-{BC29DA4E-B969-81DD-8626-B9C0117958E7}" dt="2024-09-28T15:01:50.710" v="4"/>
-      <pc:docMkLst>
-        <pc:docMk/>
-      </pc:docMkLst>
-      <pc:sldChg chg="addSp delSp modSp">
-        <pc:chgData name="Guest User" userId="S::urn:spo:anon#970bc72fef1285d03cff5ea2398e6a07664c7f7352456fb45ade4e84ec1c7961::" providerId="AD" clId="Web-{BC29DA4E-B969-81DD-8626-B9C0117958E7}" dt="2024-09-28T15:01:50.710" v="4"/>
-        <pc:sldMkLst>
-          <pc:docMk/>
-          <pc:sldMk cId="1040266725" sldId="259"/>
-        </pc:sldMkLst>
-        <pc:spChg chg="add mod">
-          <ac:chgData name="Guest User" userId="S::urn:spo:anon#970bc72fef1285d03cff5ea2398e6a07664c7f7352456fb45ade4e84ec1c7961::" providerId="AD" clId="Web-{BC29DA4E-B969-81DD-8626-B9C0117958E7}" dt="2024-09-28T15:01:50.710" v="4"/>
-          <ac:spMkLst>
-            <pc:docMk/>
-            <pc:sldMk cId="1040266725" sldId="259"/>
-            <ac:spMk id="6" creationId="{D6F27F19-7C51-C810-09BC-23456CEB8C70}"/>
-          </ac:spMkLst>
-        </pc:spChg>
-        <pc:inkChg chg="del">
-          <ac:chgData name="Guest User" userId="S::urn:spo:anon#970bc72fef1285d03cff5ea2398e6a07664c7f7352456fb45ade4e84ec1c7961::" providerId="AD" clId="Web-{BC29DA4E-B969-81DD-8626-B9C0117958E7}" dt="2024-09-28T15:00:58.005" v="0"/>
-          <ac:inkMkLst>
-            <pc:docMk/>
-            <pc:sldMk cId="1040266725" sldId="259"/>
-            <ac:inkMk id="4" creationId="{CFE6600D-13CD-D4F8-229E-32F207092418}"/>
-          </ac:inkMkLst>
-        </pc:inkChg>
-      </pc:sldChg>
-    </pc:docChg>
-  </pc:docChgLst>
-  <pc:docChgLst>
-    <pc:chgData name="Stuk, Gabriel" userId="0dcd8a03-429e-4c00-815d-e55b3b91aae4" providerId="ADAL" clId="{C10656D0-27FC-43F5-BB27-37079F55FF2F}"/>
-    <pc:docChg chg="undo custSel addSld delSld modSld">
-      <pc:chgData name="Stuk, Gabriel" userId="0dcd8a03-429e-4c00-815d-e55b3b91aae4" providerId="ADAL" clId="{C10656D0-27FC-43F5-BB27-37079F55FF2F}" dt="2024-09-28T15:13:57.689" v="7117" actId="207"/>
-      <pc:docMkLst>
-        <pc:docMk/>
-      </pc:docMkLst>
-      <pc:sldChg chg="addSp delSp modSp mod">
-        <pc:chgData name="Stuk, Gabriel" userId="0dcd8a03-429e-4c00-815d-e55b3b91aae4" providerId="ADAL" clId="{C10656D0-27FC-43F5-BB27-37079F55FF2F}" dt="2024-09-13T00:21:14.901" v="1535" actId="26606"/>
-        <pc:sldMkLst>
-          <pc:docMk/>
-          <pc:sldMk cId="779886044" sldId="256"/>
-        </pc:sldMkLst>
-        <pc:spChg chg="mod">
-          <ac:chgData name="Stuk, Gabriel" userId="0dcd8a03-429e-4c00-815d-e55b3b91aae4" providerId="ADAL" clId="{C10656D0-27FC-43F5-BB27-37079F55FF2F}" dt="2024-09-13T00:21:14.901" v="1535" actId="26606"/>
-          <ac:spMkLst>
-            <pc:docMk/>
-            <pc:sldMk cId="779886044" sldId="256"/>
-            <ac:spMk id="2" creationId="{415E2286-1FC1-F68F-9B7C-B569ABE447AE}"/>
-          </ac:spMkLst>
-        </pc:spChg>
-        <pc:spChg chg="mod">
-          <ac:chgData name="Stuk, Gabriel" userId="0dcd8a03-429e-4c00-815d-e55b3b91aae4" providerId="ADAL" clId="{C10656D0-27FC-43F5-BB27-37079F55FF2F}" dt="2024-09-13T00:21:14.901" v="1535" actId="26606"/>
-          <ac:spMkLst>
-            <pc:docMk/>
-            <pc:sldMk cId="779886044" sldId="256"/>
-            <ac:spMk id="3" creationId="{B712B3F2-5F40-2820-1BFB-2AD4421C0759}"/>
-          </ac:spMkLst>
-        </pc:spChg>
-        <pc:spChg chg="del">
-          <ac:chgData name="Stuk, Gabriel" userId="0dcd8a03-429e-4c00-815d-e55b3b91aae4" providerId="ADAL" clId="{C10656D0-27FC-43F5-BB27-37079F55FF2F}" dt="2024-09-13T00:21:14.901" v="1535" actId="26606"/>
-          <ac:spMkLst>
-            <pc:docMk/>
-            <pc:sldMk cId="779886044" sldId="256"/>
-            <ac:spMk id="9" creationId="{733E0473-C315-42D8-A82A-A2FE49DC67DA}"/>
-          </ac:spMkLst>
-        </pc:spChg>
-        <pc:spChg chg="del">
-          <ac:chgData name="Stuk, Gabriel" userId="0dcd8a03-429e-4c00-815d-e55b3b91aae4" providerId="ADAL" clId="{C10656D0-27FC-43F5-BB27-37079F55FF2F}" dt="2024-09-13T00:21:14.901" v="1535" actId="26606"/>
-          <ac:spMkLst>
-            <pc:docMk/>
-            <pc:sldMk cId="779886044" sldId="256"/>
-            <ac:spMk id="11" creationId="{AD23A251-68F2-43E5-812B-4BBAE1AF535E}"/>
-          </ac:spMkLst>
-        </pc:spChg>
-        <pc:spChg chg="add">
-          <ac:chgData name="Stuk, Gabriel" userId="0dcd8a03-429e-4c00-815d-e55b3b91aae4" providerId="ADAL" clId="{C10656D0-27FC-43F5-BB27-37079F55FF2F}" dt="2024-09-13T00:21:14.901" v="1535" actId="26606"/>
-          <ac:spMkLst>
-            <pc:docMk/>
-            <pc:sldMk cId="779886044" sldId="256"/>
-            <ac:spMk id="26" creationId="{55D20674-CF0C-4687-81B6-A613F871AF46}"/>
-          </ac:spMkLst>
-        </pc:spChg>
-        <pc:spChg chg="add">
-          <ac:chgData name="Stuk, Gabriel" userId="0dcd8a03-429e-4c00-815d-e55b3b91aae4" providerId="ADAL" clId="{C10656D0-27FC-43F5-BB27-37079F55FF2F}" dt="2024-09-13T00:21:14.901" v="1535" actId="26606"/>
-          <ac:spMkLst>
-            <pc:docMk/>
-            <pc:sldMk cId="779886044" sldId="256"/>
-            <ac:spMk id="28" creationId="{C2BD3211-5B9B-40DA-8BD0-C3426AE78CEE}"/>
-          </ac:spMkLst>
-        </pc:spChg>
-        <pc:spChg chg="add">
-          <ac:chgData name="Stuk, Gabriel" userId="0dcd8a03-429e-4c00-815d-e55b3b91aae4" providerId="ADAL" clId="{C10656D0-27FC-43F5-BB27-37079F55FF2F}" dt="2024-09-13T00:21:14.901" v="1535" actId="26606"/>
-          <ac:spMkLst>
-            <pc:docMk/>
-            <pc:sldMk cId="779886044" sldId="256"/>
-            <ac:spMk id="30" creationId="{AD8121B6-45E6-447F-87B8-58EDD064ED93}"/>
-          </ac:spMkLst>
-        </pc:spChg>
-        <pc:spChg chg="add">
-          <ac:chgData name="Stuk, Gabriel" userId="0dcd8a03-429e-4c00-815d-e55b3b91aae4" providerId="ADAL" clId="{C10656D0-27FC-43F5-BB27-37079F55FF2F}" dt="2024-09-13T00:21:14.901" v="1535" actId="26606"/>
-          <ac:spMkLst>
-            <pc:docMk/>
-            <pc:sldMk cId="779886044" sldId="256"/>
-            <ac:spMk id="32" creationId="{FC95B8E3-CBB0-4A5C-B65B-59C12D44BB27}"/>
-          </ac:spMkLst>
-        </pc:spChg>
-        <pc:spChg chg="add">
-          <ac:chgData name="Stuk, Gabriel" userId="0dcd8a03-429e-4c00-815d-e55b3b91aae4" providerId="ADAL" clId="{C10656D0-27FC-43F5-BB27-37079F55FF2F}" dt="2024-09-13T00:21:14.901" v="1535" actId="26606"/>
-          <ac:spMkLst>
-            <pc:docMk/>
-            <pc:sldMk cId="779886044" sldId="256"/>
-            <ac:spMk id="34" creationId="{0EA710C0-F536-4B31-8D0F-28E2F0893A50}"/>
-          </ac:spMkLst>
-        </pc:spChg>
-        <pc:spChg chg="add">
-          <ac:chgData name="Stuk, Gabriel" userId="0dcd8a03-429e-4c00-815d-e55b3b91aae4" providerId="ADAL" clId="{C10656D0-27FC-43F5-BB27-37079F55FF2F}" dt="2024-09-13T00:21:14.901" v="1535" actId="26606"/>
-          <ac:spMkLst>
-            <pc:docMk/>
-            <pc:sldMk cId="779886044" sldId="256"/>
-            <ac:spMk id="36" creationId="{11EB61F8-34CD-4251-9B31-59AB92843F5F}"/>
-          </ac:spMkLst>
-        </pc:spChg>
-        <pc:spChg chg="add">
-          <ac:chgData name="Stuk, Gabriel" userId="0dcd8a03-429e-4c00-815d-e55b3b91aae4" providerId="ADAL" clId="{C10656D0-27FC-43F5-BB27-37079F55FF2F}" dt="2024-09-13T00:21:14.901" v="1535" actId="26606"/>
-          <ac:spMkLst>
-            <pc:docMk/>
-            <pc:sldMk cId="779886044" sldId="256"/>
-            <ac:spMk id="38" creationId="{033FA5DB-69DC-4137-9264-5F838B99043F}"/>
-          </ac:spMkLst>
-        </pc:spChg>
-        <pc:spChg chg="add">
-          <ac:chgData name="Stuk, Gabriel" userId="0dcd8a03-429e-4c00-815d-e55b3b91aae4" providerId="ADAL" clId="{C10656D0-27FC-43F5-BB27-37079F55FF2F}" dt="2024-09-13T00:21:14.901" v="1535" actId="26606"/>
-          <ac:spMkLst>
-            <pc:docMk/>
-            <pc:sldMk cId="779886044" sldId="256"/>
-            <ac:spMk id="40" creationId="{5E98D956-6B7A-4A94-B508-F7A30E642105}"/>
-          </ac:spMkLst>
-        </pc:spChg>
-        <pc:spChg chg="add">
-          <ac:chgData name="Stuk, Gabriel" userId="0dcd8a03-429e-4c00-815d-e55b3b91aae4" providerId="ADAL" clId="{C10656D0-27FC-43F5-BB27-37079F55FF2F}" dt="2024-09-13T00:21:14.901" v="1535" actId="26606"/>
-          <ac:spMkLst>
-            <pc:docMk/>
-            <pc:sldMk cId="779886044" sldId="256"/>
-            <ac:spMk id="42" creationId="{D6A3D2FC-6F98-4157-94A8-7D7FBD56EF86}"/>
-          </ac:spMkLst>
-        </pc:spChg>
-        <pc:spChg chg="add">
-          <ac:chgData name="Stuk, Gabriel" userId="0dcd8a03-429e-4c00-815d-e55b3b91aae4" providerId="ADAL" clId="{C10656D0-27FC-43F5-BB27-37079F55FF2F}" dt="2024-09-13T00:21:14.901" v="1535" actId="26606"/>
-          <ac:spMkLst>
-            <pc:docMk/>
-            <pc:sldMk cId="779886044" sldId="256"/>
-            <ac:spMk id="44" creationId="{17AE16AB-F0AB-4AC3-BD8F-336B5D98CD58}"/>
-          </ac:spMkLst>
-        </pc:spChg>
-        <pc:spChg chg="add">
-          <ac:chgData name="Stuk, Gabriel" userId="0dcd8a03-429e-4c00-815d-e55b3b91aae4" providerId="ADAL" clId="{C10656D0-27FC-43F5-BB27-37079F55FF2F}" dt="2024-09-13T00:21:14.901" v="1535" actId="26606"/>
-          <ac:spMkLst>
-            <pc:docMk/>
-            <pc:sldMk cId="779886044" sldId="256"/>
-            <ac:spMk id="46" creationId="{6C819BFF-25C5-425C-8CD1-789F7A30D26B}"/>
-          </ac:spMkLst>
-        </pc:spChg>
-        <pc:spChg chg="add">
-          <ac:chgData name="Stuk, Gabriel" userId="0dcd8a03-429e-4c00-815d-e55b3b91aae4" providerId="ADAL" clId="{C10656D0-27FC-43F5-BB27-37079F55FF2F}" dt="2024-09-13T00:21:14.901" v="1535" actId="26606"/>
-          <ac:spMkLst>
-            <pc:docMk/>
-            <pc:sldMk cId="779886044" sldId="256"/>
-            <ac:spMk id="48" creationId="{20BE49C6-06E3-4324-91A8-F25B7DA1D564}"/>
-          </ac:spMkLst>
-        </pc:spChg>
-        <pc:spChg chg="add">
-          <ac:chgData name="Stuk, Gabriel" userId="0dcd8a03-429e-4c00-815d-e55b3b91aae4" providerId="ADAL" clId="{C10656D0-27FC-43F5-BB27-37079F55FF2F}" dt="2024-09-13T00:21:14.901" v="1535" actId="26606"/>
-          <ac:spMkLst>
-            <pc:docMk/>
-            <pc:sldMk cId="779886044" sldId="256"/>
-            <ac:spMk id="50" creationId="{578ABC8A-B58F-4AAE-8F6F-A07EB9D6DDE6}"/>
-          </ac:spMkLst>
-        </pc:spChg>
-        <pc:grpChg chg="del">
-          <ac:chgData name="Stuk, Gabriel" userId="0dcd8a03-429e-4c00-815d-e55b3b91aae4" providerId="ADAL" clId="{C10656D0-27FC-43F5-BB27-37079F55FF2F}" dt="2024-09-13T00:21:14.901" v="1535" actId="26606"/>
-          <ac:grpSpMkLst>
-            <pc:docMk/>
-            <pc:sldMk cId="779886044" sldId="256"/>
-            <ac:grpSpMk id="13" creationId="{0350AF23-2606-421F-AB7B-23D9B48F3E9B}"/>
-          </ac:grpSpMkLst>
-        </pc:grpChg>
-        <pc:picChg chg="mod">
-          <ac:chgData name="Stuk, Gabriel" userId="0dcd8a03-429e-4c00-815d-e55b3b91aae4" providerId="ADAL" clId="{C10656D0-27FC-43F5-BB27-37079F55FF2F}" dt="2024-09-13T00:21:14.901" v="1535" actId="26606"/>
-          <ac:picMkLst>
-            <pc:docMk/>
-            <pc:sldMk cId="779886044" sldId="256"/>
-            <ac:picMk id="4" creationId="{1C55F861-A804-85B3-B8F9-44A75564314D}"/>
-          </ac:picMkLst>
-        </pc:picChg>
-      </pc:sldChg>
-      <pc:sldChg chg="addSp modSp mod">
-        <pc:chgData name="Stuk, Gabriel" userId="0dcd8a03-429e-4c00-815d-e55b3b91aae4" providerId="ADAL" clId="{C10656D0-27FC-43F5-BB27-37079F55FF2F}" dt="2024-09-13T00:16:48.341" v="1534" actId="20577"/>
-        <pc:sldMkLst>
-          <pc:docMk/>
-          <pc:sldMk cId="3306336011" sldId="258"/>
-        </pc:sldMkLst>
-        <pc:spChg chg="mod">
-          <ac:chgData name="Stuk, Gabriel" userId="0dcd8a03-429e-4c00-815d-e55b3b91aae4" providerId="ADAL" clId="{C10656D0-27FC-43F5-BB27-37079F55FF2F}" dt="2024-09-13T00:16:48.341" v="1534" actId="20577"/>
-          <ac:spMkLst>
-            <pc:docMk/>
-            <pc:sldMk cId="3306336011" sldId="258"/>
-            <ac:spMk id="3" creationId="{5E26988A-0703-06A9-F2AE-C3239873163E}"/>
-          </ac:spMkLst>
-        </pc:spChg>
-        <pc:picChg chg="add mod">
-          <ac:chgData name="Stuk, Gabriel" userId="0dcd8a03-429e-4c00-815d-e55b3b91aae4" providerId="ADAL" clId="{C10656D0-27FC-43F5-BB27-37079F55FF2F}" dt="2024-09-12T22:13:47.019" v="98" actId="1076"/>
-          <ac:picMkLst>
-            <pc:docMk/>
-            <pc:sldMk cId="3306336011" sldId="258"/>
-            <ac:picMk id="5" creationId="{5CAAEB93-C0A3-C486-A059-D25F07756B4B}"/>
-          </ac:picMkLst>
-        </pc:picChg>
-      </pc:sldChg>
-      <pc:sldChg chg="addSp modSp new mod setBg">
-        <pc:chgData name="Stuk, Gabriel" userId="0dcd8a03-429e-4c00-815d-e55b3b91aae4" providerId="ADAL" clId="{C10656D0-27FC-43F5-BB27-37079F55FF2F}" dt="2024-09-28T15:02:21.256" v="7091" actId="1076"/>
-        <pc:sldMkLst>
-          <pc:docMk/>
-          <pc:sldMk cId="1040266725" sldId="259"/>
-        </pc:sldMkLst>
-        <pc:spChg chg="mod">
-          <ac:chgData name="Stuk, Gabriel" userId="0dcd8a03-429e-4c00-815d-e55b3b91aae4" providerId="ADAL" clId="{C10656D0-27FC-43F5-BB27-37079F55FF2F}" dt="2024-09-12T22:19:38.775" v="527" actId="26606"/>
-          <ac:spMkLst>
-            <pc:docMk/>
-            <pc:sldMk cId="1040266725" sldId="259"/>
-            <ac:spMk id="2" creationId="{23C19658-DE1C-C4EA-0F67-1781A5949B03}"/>
-          </ac:spMkLst>
-        </pc:spChg>
-        <pc:spChg chg="mod">
-          <ac:chgData name="Stuk, Gabriel" userId="0dcd8a03-429e-4c00-815d-e55b3b91aae4" providerId="ADAL" clId="{C10656D0-27FC-43F5-BB27-37079F55FF2F}" dt="2024-09-12T22:19:38.775" v="527" actId="26606"/>
-          <ac:spMkLst>
-            <pc:docMk/>
-            <pc:sldMk cId="1040266725" sldId="259"/>
-            <ac:spMk id="3" creationId="{31F27C62-B3F4-BEF6-1D42-572841FB047F}"/>
-          </ac:spMkLst>
-        </pc:spChg>
-        <pc:spChg chg="mod">
-          <ac:chgData name="Stuk, Gabriel" userId="0dcd8a03-429e-4c00-815d-e55b3b91aae4" providerId="ADAL" clId="{C10656D0-27FC-43F5-BB27-37079F55FF2F}" dt="2024-09-28T15:02:21.256" v="7091" actId="1076"/>
-          <ac:spMkLst>
-            <pc:docMk/>
-            <pc:sldMk cId="1040266725" sldId="259"/>
-            <ac:spMk id="6" creationId="{D6F27F19-7C51-C810-09BC-23456CEB8C70}"/>
-          </ac:spMkLst>
-        </pc:spChg>
-        <pc:spChg chg="add">
-          <ac:chgData name="Stuk, Gabriel" userId="0dcd8a03-429e-4c00-815d-e55b3b91aae4" providerId="ADAL" clId="{C10656D0-27FC-43F5-BB27-37079F55FF2F}" dt="2024-09-12T22:19:38.775" v="527" actId="26606"/>
-          <ac:spMkLst>
-            <pc:docMk/>
-            <pc:sldMk cId="1040266725" sldId="259"/>
-            <ac:spMk id="10" creationId="{4F8E18AC-903E-4B46-8CC0-FE20E612CE37}"/>
-          </ac:spMkLst>
-        </pc:spChg>
-        <pc:spChg chg="add">
-          <ac:chgData name="Stuk, Gabriel" userId="0dcd8a03-429e-4c00-815d-e55b3b91aae4" providerId="ADAL" clId="{C10656D0-27FC-43F5-BB27-37079F55FF2F}" dt="2024-09-12T22:19:38.775" v="527" actId="26606"/>
-          <ac:spMkLst>
-            <pc:docMk/>
-            <pc:sldMk cId="1040266725" sldId="259"/>
-            <ac:spMk id="12" creationId="{3DEE38FB-0763-470C-8A5E-44456B5130D7}"/>
-          </ac:spMkLst>
-        </pc:spChg>
-        <pc:spChg chg="add">
-          <ac:chgData name="Stuk, Gabriel" userId="0dcd8a03-429e-4c00-815d-e55b3b91aae4" providerId="ADAL" clId="{C10656D0-27FC-43F5-BB27-37079F55FF2F}" dt="2024-09-12T22:19:38.775" v="527" actId="26606"/>
-          <ac:spMkLst>
-            <pc:docMk/>
-            <pc:sldMk cId="1040266725" sldId="259"/>
-            <ac:spMk id="14" creationId="{F1D6E6C0-11C7-4A38-BD12-80741960B53C}"/>
-          </ac:spMkLst>
-        </pc:spChg>
-        <pc:grpChg chg="add">
-          <ac:chgData name="Stuk, Gabriel" userId="0dcd8a03-429e-4c00-815d-e55b3b91aae4" providerId="ADAL" clId="{C10656D0-27FC-43F5-BB27-37079F55FF2F}" dt="2024-09-12T22:19:38.775" v="527" actId="26606"/>
-          <ac:grpSpMkLst>
-            <pc:docMk/>
-            <pc:sldMk cId="1040266725" sldId="259"/>
-            <ac:grpSpMk id="16" creationId="{2B16E781-E64A-4007-B0F1-5A50135A4276}"/>
-          </ac:grpSpMkLst>
-        </pc:grpChg>
-        <pc:picChg chg="add mod">
-          <ac:chgData name="Stuk, Gabriel" userId="0dcd8a03-429e-4c00-815d-e55b3b91aae4" providerId="ADAL" clId="{C10656D0-27FC-43F5-BB27-37079F55FF2F}" dt="2024-09-12T22:19:41.140" v="529" actId="962"/>
-          <ac:picMkLst>
-            <pc:docMk/>
-            <pc:sldMk cId="1040266725" sldId="259"/>
-            <ac:picMk id="5" creationId="{0C6D8BB6-7E29-3284-4947-EBC9587C8C81}"/>
-          </ac:picMkLst>
-        </pc:picChg>
-        <pc:inkChg chg="add">
-          <ac:chgData name="Stuk, Gabriel" userId="0dcd8a03-429e-4c00-815d-e55b3b91aae4" providerId="ADAL" clId="{C10656D0-27FC-43F5-BB27-37079F55FF2F}" dt="2024-09-16T13:43:56.614" v="3089" actId="9405"/>
-          <ac:inkMkLst>
-            <pc:docMk/>
-            <pc:sldMk cId="1040266725" sldId="259"/>
-            <ac:inkMk id="4" creationId="{CFE6600D-13CD-D4F8-229E-32F207092418}"/>
-          </ac:inkMkLst>
-        </pc:inkChg>
-      </pc:sldChg>
-      <pc:sldChg chg="addSp delSp modSp new mod setBg">
-        <pc:chgData name="Stuk, Gabriel" userId="0dcd8a03-429e-4c00-815d-e55b3b91aae4" providerId="ADAL" clId="{C10656D0-27FC-43F5-BB27-37079F55FF2F}" dt="2024-09-28T15:03:15.472" v="7097" actId="14100"/>
-        <pc:sldMkLst>
-          <pc:docMk/>
-          <pc:sldMk cId="8740130" sldId="260"/>
-        </pc:sldMkLst>
-        <pc:spChg chg="mod">
-          <ac:chgData name="Stuk, Gabriel" userId="0dcd8a03-429e-4c00-815d-e55b3b91aae4" providerId="ADAL" clId="{C10656D0-27FC-43F5-BB27-37079F55FF2F}" dt="2024-09-12T22:24:17.216" v="1375" actId="26606"/>
-          <ac:spMkLst>
-            <pc:docMk/>
-            <pc:sldMk cId="8740130" sldId="260"/>
-            <ac:spMk id="2" creationId="{61C9904D-F858-8209-16F5-99C0CBC2CFA4}"/>
-          </ac:spMkLst>
-        </pc:spChg>
-        <pc:spChg chg="mod">
-          <ac:chgData name="Stuk, Gabriel" userId="0dcd8a03-429e-4c00-815d-e55b3b91aae4" providerId="ADAL" clId="{C10656D0-27FC-43F5-BB27-37079F55FF2F}" dt="2024-09-12T22:59:25.922" v="1378" actId="20577"/>
-          <ac:spMkLst>
-            <pc:docMk/>
-            <pc:sldMk cId="8740130" sldId="260"/>
-            <ac:spMk id="3" creationId="{C9FAE1F0-7124-52FC-F357-7037B401C6D3}"/>
-          </ac:spMkLst>
-        </pc:spChg>
-        <pc:spChg chg="add">
-          <ac:chgData name="Stuk, Gabriel" userId="0dcd8a03-429e-4c00-815d-e55b3b91aae4" providerId="ADAL" clId="{C10656D0-27FC-43F5-BB27-37079F55FF2F}" dt="2024-09-12T22:24:17.216" v="1375" actId="26606"/>
-          <ac:spMkLst>
-            <pc:docMk/>
-            <pc:sldMk cId="8740130" sldId="260"/>
-            <ac:spMk id="10" creationId="{4F8E18AC-903E-4B46-8CC0-FE20E612CE37}"/>
-          </ac:spMkLst>
-        </pc:spChg>
-        <pc:spChg chg="add mod">
-          <ac:chgData name="Stuk, Gabriel" userId="0dcd8a03-429e-4c00-815d-e55b3b91aae4" providerId="ADAL" clId="{C10656D0-27FC-43F5-BB27-37079F55FF2F}" dt="2024-09-28T15:03:15.472" v="7097" actId="14100"/>
-          <ac:spMkLst>
-            <pc:docMk/>
-            <pc:sldMk cId="8740130" sldId="260"/>
-            <ac:spMk id="11" creationId="{7C50B646-C7BD-4E8B-9F13-FFA0F01FAC92}"/>
-          </ac:spMkLst>
-        </pc:spChg>
-        <pc:spChg chg="add">
-          <ac:chgData name="Stuk, Gabriel" userId="0dcd8a03-429e-4c00-815d-e55b3b91aae4" providerId="ADAL" clId="{C10656D0-27FC-43F5-BB27-37079F55FF2F}" dt="2024-09-12T22:24:17.216" v="1375" actId="26606"/>
-          <ac:spMkLst>
-            <pc:docMk/>
-            <pc:sldMk cId="8740130" sldId="260"/>
-            <ac:spMk id="12" creationId="{3DEE38FB-0763-470C-8A5E-44456B5130D7}"/>
-          </ac:spMkLst>
-        </pc:spChg>
-        <pc:spChg chg="add">
-          <ac:chgData name="Stuk, Gabriel" userId="0dcd8a03-429e-4c00-815d-e55b3b91aae4" providerId="ADAL" clId="{C10656D0-27FC-43F5-BB27-37079F55FF2F}" dt="2024-09-12T22:24:17.216" v="1375" actId="26606"/>
-          <ac:spMkLst>
-            <pc:docMk/>
-            <pc:sldMk cId="8740130" sldId="260"/>
-            <ac:spMk id="14" creationId="{F1D6E6C0-11C7-4A38-BD12-80741960B53C}"/>
-          </ac:spMkLst>
-        </pc:spChg>
-        <pc:spChg chg="add del">
-          <ac:chgData name="Stuk, Gabriel" userId="0dcd8a03-429e-4c00-815d-e55b3b91aae4" providerId="ADAL" clId="{C10656D0-27FC-43F5-BB27-37079F55FF2F}" dt="2024-09-28T15:02:53.045" v="7093" actId="34124"/>
-          <ac:spMkLst>
-            <pc:docMk/>
-            <pc:sldMk cId="8740130" sldId="260"/>
-            <ac:spMk id="36" creationId="{4DACBE06-CA72-4295-8B12-5CADC81F3187}"/>
-          </ac:spMkLst>
-        </pc:spChg>
-        <pc:grpChg chg="add">
-          <ac:chgData name="Stuk, Gabriel" userId="0dcd8a03-429e-4c00-815d-e55b3b91aae4" providerId="ADAL" clId="{C10656D0-27FC-43F5-BB27-37079F55FF2F}" dt="2024-09-12T22:24:17.216" v="1375" actId="26606"/>
-          <ac:grpSpMkLst>
-            <pc:docMk/>
-            <pc:sldMk cId="8740130" sldId="260"/>
-            <ac:grpSpMk id="16" creationId="{2B16E781-E64A-4007-B0F1-5A50135A4276}"/>
-          </ac:grpSpMkLst>
-        </pc:grpChg>
-        <pc:picChg chg="add mod">
-          <ac:chgData name="Stuk, Gabriel" userId="0dcd8a03-429e-4c00-815d-e55b3b91aae4" providerId="ADAL" clId="{C10656D0-27FC-43F5-BB27-37079F55FF2F}" dt="2024-09-12T22:24:18.506" v="1377" actId="962"/>
-          <ac:picMkLst>
-            <pc:docMk/>
-            <pc:sldMk cId="8740130" sldId="260"/>
-            <ac:picMk id="5" creationId="{831CBB07-0C6E-A138-4C36-8FF5B55F143C}"/>
-          </ac:picMkLst>
-        </pc:picChg>
-        <pc:inkChg chg="add del">
-          <ac:chgData name="Stuk, Gabriel" userId="0dcd8a03-429e-4c00-815d-e55b3b91aae4" providerId="ADAL" clId="{C10656D0-27FC-43F5-BB27-37079F55FF2F}" dt="2024-09-16T13:43:38.762" v="3087" actId="9405"/>
-          <ac:inkMkLst>
-            <pc:docMk/>
-            <pc:sldMk cId="8740130" sldId="260"/>
-            <ac:inkMk id="4" creationId="{3C1BE484-424D-6E80-98BF-D47BC9D2EFA4}"/>
-          </ac:inkMkLst>
-        </pc:inkChg>
-        <pc:inkChg chg="add del">
-          <ac:chgData name="Stuk, Gabriel" userId="0dcd8a03-429e-4c00-815d-e55b3b91aae4" providerId="ADAL" clId="{C10656D0-27FC-43F5-BB27-37079F55FF2F}" dt="2024-09-28T15:02:46.817" v="7092" actId="34122"/>
-          <ac:inkMkLst>
-            <pc:docMk/>
-            <pc:sldMk cId="8740130" sldId="260"/>
-            <ac:inkMk id="6" creationId="{3FDA9BBC-71C7-2BCE-FE87-49725CFE745E}"/>
-          </ac:inkMkLst>
-        </pc:inkChg>
-      </pc:sldChg>
-      <pc:sldChg chg="addSp delSp modSp new mod setBg chgLayout">
-        <pc:chgData name="Stuk, Gabriel" userId="0dcd8a03-429e-4c00-815d-e55b3b91aae4" providerId="ADAL" clId="{C10656D0-27FC-43F5-BB27-37079F55FF2F}" dt="2024-09-28T15:06:13.401" v="7099" actId="1076"/>
-        <pc:sldMkLst>
-          <pc:docMk/>
-          <pc:sldMk cId="272849991" sldId="261"/>
-        </pc:sldMkLst>
-        <pc:spChg chg="add del mod">
-          <ac:chgData name="Stuk, Gabriel" userId="0dcd8a03-429e-4c00-815d-e55b3b91aae4" providerId="ADAL" clId="{C10656D0-27FC-43F5-BB27-37079F55FF2F}" dt="2024-09-16T12:21:32.630" v="1998" actId="26606"/>
-          <ac:spMkLst>
-            <pc:docMk/>
-            <pc:sldMk cId="272849991" sldId="261"/>
-            <ac:spMk id="2" creationId="{DC6A2AB3-8F50-B486-3007-87CF85E7120F}"/>
-          </ac:spMkLst>
-        </pc:spChg>
-        <pc:spChg chg="add del mod">
-          <ac:chgData name="Stuk, Gabriel" userId="0dcd8a03-429e-4c00-815d-e55b3b91aae4" providerId="ADAL" clId="{C10656D0-27FC-43F5-BB27-37079F55FF2F}" dt="2024-09-16T12:21:32.630" v="1998" actId="26606"/>
-          <ac:spMkLst>
-            <pc:docMk/>
-            <pc:sldMk cId="272849991" sldId="261"/>
-            <ac:spMk id="3" creationId="{A9C96353-B909-1DBD-46B0-F15540D7A9BE}"/>
-          </ac:spMkLst>
-        </pc:spChg>
-        <pc:spChg chg="add del mod ord">
-          <ac:chgData name="Stuk, Gabriel" userId="0dcd8a03-429e-4c00-815d-e55b3b91aae4" providerId="ADAL" clId="{C10656D0-27FC-43F5-BB27-37079F55FF2F}" dt="2024-09-12T23:02:23.347" v="1381" actId="6264"/>
-          <ac:spMkLst>
-            <pc:docMk/>
-            <pc:sldMk cId="272849991" sldId="261"/>
-            <ac:spMk id="4" creationId="{5304EE0B-7849-2E40-7790-C398673B576B}"/>
-          </ac:spMkLst>
-        </pc:spChg>
-        <pc:spChg chg="add del mod ord">
-          <ac:chgData name="Stuk, Gabriel" userId="0dcd8a03-429e-4c00-815d-e55b3b91aae4" providerId="ADAL" clId="{C10656D0-27FC-43F5-BB27-37079F55FF2F}" dt="2024-09-12T23:02:23.347" v="1381" actId="6264"/>
-          <ac:spMkLst>
-            <pc:docMk/>
-            <pc:sldMk cId="272849991" sldId="261"/>
-            <ac:spMk id="5" creationId="{11400531-1670-BD8A-98DC-7E5ADA150025}"/>
-          </ac:spMkLst>
-        </pc:spChg>
-        <pc:spChg chg="add del">
-          <ac:chgData name="Stuk, Gabriel" userId="0dcd8a03-429e-4c00-815d-e55b3b91aae4" providerId="ADAL" clId="{C10656D0-27FC-43F5-BB27-37079F55FF2F}" dt="2024-09-12T23:04:21.450" v="1414" actId="11529"/>
-          <ac:spMkLst>
-            <pc:docMk/>
-            <pc:sldMk cId="272849991" sldId="261"/>
-            <ac:spMk id="6" creationId="{29A1F648-10D8-A89A-4460-218768ADBE51}"/>
-          </ac:spMkLst>
-        </pc:spChg>
-        <pc:spChg chg="add">
-          <ac:chgData name="Stuk, Gabriel" userId="0dcd8a03-429e-4c00-815d-e55b3b91aae4" providerId="ADAL" clId="{C10656D0-27FC-43F5-BB27-37079F55FF2F}" dt="2024-09-16T12:21:32.630" v="1998" actId="26606"/>
-          <ac:spMkLst>
-            <pc:docMk/>
-            <pc:sldMk cId="272849991" sldId="261"/>
-            <ac:spMk id="10" creationId="{4F8E18AC-903E-4B46-8CC0-FE20E612CE37}"/>
-          </ac:spMkLst>
-        </pc:spChg>
-        <pc:spChg chg="add">
-          <ac:chgData name="Stuk, Gabriel" userId="0dcd8a03-429e-4c00-815d-e55b3b91aae4" providerId="ADAL" clId="{C10656D0-27FC-43F5-BB27-37079F55FF2F}" dt="2024-09-16T12:21:32.630" v="1998" actId="26606"/>
-          <ac:spMkLst>
-            <pc:docMk/>
-            <pc:sldMk cId="272849991" sldId="261"/>
-            <ac:spMk id="12" creationId="{3DEE38FB-0763-470C-8A5E-44456B5130D7}"/>
-          </ac:spMkLst>
-        </pc:spChg>
-        <pc:spChg chg="add">
-          <ac:chgData name="Stuk, Gabriel" userId="0dcd8a03-429e-4c00-815d-e55b3b91aae4" providerId="ADAL" clId="{C10656D0-27FC-43F5-BB27-37079F55FF2F}" dt="2024-09-16T12:21:32.630" v="1998" actId="26606"/>
-          <ac:spMkLst>
-            <pc:docMk/>
-            <pc:sldMk cId="272849991" sldId="261"/>
-            <ac:spMk id="14" creationId="{F1D6E6C0-11C7-4A38-BD12-80741960B53C}"/>
-          </ac:spMkLst>
-        </pc:spChg>
-        <pc:spChg chg="add mod">
-          <ac:chgData name="Stuk, Gabriel" userId="0dcd8a03-429e-4c00-815d-e55b3b91aae4" providerId="ADAL" clId="{C10656D0-27FC-43F5-BB27-37079F55FF2F}" dt="2024-09-28T15:06:13.401" v="7099" actId="1076"/>
-          <ac:spMkLst>
-            <pc:docMk/>
-            <pc:sldMk cId="272849991" sldId="261"/>
-            <ac:spMk id="32" creationId="{2F1380F5-5DED-4CC9-B193-60EF57BEBABE}"/>
-          </ac:spMkLst>
-        </pc:spChg>
-        <pc:grpChg chg="add">
-          <ac:chgData name="Stuk, Gabriel" userId="0dcd8a03-429e-4c00-815d-e55b3b91aae4" providerId="ADAL" clId="{C10656D0-27FC-43F5-BB27-37079F55FF2F}" dt="2024-09-16T12:21:32.630" v="1998" actId="26606"/>
-          <ac:grpSpMkLst>
-            <pc:docMk/>
-            <pc:sldMk cId="272849991" sldId="261"/>
-            <ac:grpSpMk id="16" creationId="{2B16E781-E64A-4007-B0F1-5A50135A4276}"/>
-          </ac:grpSpMkLst>
-        </pc:grpChg>
-        <pc:picChg chg="add mod">
-          <ac:chgData name="Stuk, Gabriel" userId="0dcd8a03-429e-4c00-815d-e55b3b91aae4" providerId="ADAL" clId="{C10656D0-27FC-43F5-BB27-37079F55FF2F}" dt="2024-09-16T12:21:33.871" v="2000" actId="962"/>
-          <ac:picMkLst>
-            <pc:docMk/>
-            <pc:sldMk cId="272849991" sldId="261"/>
-            <ac:picMk id="5" creationId="{C715916F-A3C7-30FC-7FB0-0A86215C8ECB}"/>
-          </ac:picMkLst>
-        </pc:picChg>
-        <pc:inkChg chg="add del">
-          <ac:chgData name="Stuk, Gabriel" userId="0dcd8a03-429e-4c00-815d-e55b3b91aae4" providerId="ADAL" clId="{C10656D0-27FC-43F5-BB27-37079F55FF2F}" dt="2024-09-28T15:06:10.169" v="7098" actId="34122"/>
-          <ac:inkMkLst>
-            <pc:docMk/>
-            <pc:sldMk cId="272849991" sldId="261"/>
-            <ac:inkMk id="6" creationId="{1512A042-781C-3D0E-61F5-18C2F58A9987}"/>
-          </ac:inkMkLst>
-        </pc:inkChg>
-      </pc:sldChg>
-      <pc:sldChg chg="addSp delSp modSp new mod setBg">
-        <pc:chgData name="Stuk, Gabriel" userId="0dcd8a03-429e-4c00-815d-e55b3b91aae4" providerId="ADAL" clId="{C10656D0-27FC-43F5-BB27-37079F55FF2F}" dt="2024-09-28T15:06:21.610" v="7101" actId="1076"/>
-        <pc:sldMkLst>
-          <pc:docMk/>
-          <pc:sldMk cId="1402053733" sldId="262"/>
-        </pc:sldMkLst>
-        <pc:spChg chg="mod">
-          <ac:chgData name="Stuk, Gabriel" userId="0dcd8a03-429e-4c00-815d-e55b3b91aae4" providerId="ADAL" clId="{C10656D0-27FC-43F5-BB27-37079F55FF2F}" dt="2024-09-16T13:36:02.920" v="2431" actId="26606"/>
-          <ac:spMkLst>
-            <pc:docMk/>
-            <pc:sldMk cId="1402053733" sldId="262"/>
-            <ac:spMk id="2" creationId="{3226B89A-E8A4-04C4-7658-554B790D78A7}"/>
-          </ac:spMkLst>
-        </pc:spChg>
-        <pc:spChg chg="mod">
-          <ac:chgData name="Stuk, Gabriel" userId="0dcd8a03-429e-4c00-815d-e55b3b91aae4" providerId="ADAL" clId="{C10656D0-27FC-43F5-BB27-37079F55FF2F}" dt="2024-09-16T13:36:02.920" v="2431" actId="26606"/>
-          <ac:spMkLst>
-            <pc:docMk/>
-            <pc:sldMk cId="1402053733" sldId="262"/>
-            <ac:spMk id="3" creationId="{BA1AE720-DF08-BFE1-A867-C1EE3034CF92}"/>
-          </ac:spMkLst>
-        </pc:spChg>
-        <pc:spChg chg="add">
-          <ac:chgData name="Stuk, Gabriel" userId="0dcd8a03-429e-4c00-815d-e55b3b91aae4" providerId="ADAL" clId="{C10656D0-27FC-43F5-BB27-37079F55FF2F}" dt="2024-09-16T13:36:02.920" v="2431" actId="26606"/>
-          <ac:spMkLst>
-            <pc:docMk/>
-            <pc:sldMk cId="1402053733" sldId="262"/>
-            <ac:spMk id="9" creationId="{4F8E18AC-903E-4B46-8CC0-FE20E612CE37}"/>
-          </ac:spMkLst>
-        </pc:spChg>
-        <pc:spChg chg="add del">
-          <ac:chgData name="Stuk, Gabriel" userId="0dcd8a03-429e-4c00-815d-e55b3b91aae4" providerId="ADAL" clId="{C10656D0-27FC-43F5-BB27-37079F55FF2F}" dt="2024-09-16T13:35:31.843" v="2428" actId="26606"/>
-          <ac:spMkLst>
-            <pc:docMk/>
-            <pc:sldMk cId="1402053733" sldId="262"/>
-            <ac:spMk id="10" creationId="{4F8E18AC-903E-4B46-8CC0-FE20E612CE37}"/>
-          </ac:spMkLst>
-        </pc:spChg>
-        <pc:spChg chg="add">
-          <ac:chgData name="Stuk, Gabriel" userId="0dcd8a03-429e-4c00-815d-e55b3b91aae4" providerId="ADAL" clId="{C10656D0-27FC-43F5-BB27-37079F55FF2F}" dt="2024-09-16T13:36:02.920" v="2431" actId="26606"/>
-          <ac:spMkLst>
-            <pc:docMk/>
-            <pc:sldMk cId="1402053733" sldId="262"/>
-            <ac:spMk id="11" creationId="{3DEE38FB-0763-470C-8A5E-44456B5130D7}"/>
-          </ac:spMkLst>
-        </pc:spChg>
-        <pc:spChg chg="add del">
-          <ac:chgData name="Stuk, Gabriel" userId="0dcd8a03-429e-4c00-815d-e55b3b91aae4" providerId="ADAL" clId="{C10656D0-27FC-43F5-BB27-37079F55FF2F}" dt="2024-09-16T13:35:31.843" v="2428" actId="26606"/>
-          <ac:spMkLst>
-            <pc:docMk/>
-            <pc:sldMk cId="1402053733" sldId="262"/>
-            <ac:spMk id="12" creationId="{3DEE38FB-0763-470C-8A5E-44456B5130D7}"/>
-          </ac:spMkLst>
-        </pc:spChg>
-        <pc:spChg chg="add">
-          <ac:chgData name="Stuk, Gabriel" userId="0dcd8a03-429e-4c00-815d-e55b3b91aae4" providerId="ADAL" clId="{C10656D0-27FC-43F5-BB27-37079F55FF2F}" dt="2024-09-16T13:36:02.920" v="2431" actId="26606"/>
-          <ac:spMkLst>
-            <pc:docMk/>
-            <pc:sldMk cId="1402053733" sldId="262"/>
-            <ac:spMk id="13" creationId="{F1D6E6C0-11C7-4A38-BD12-80741960B53C}"/>
-          </ac:spMkLst>
-        </pc:spChg>
-        <pc:spChg chg="add del">
-          <ac:chgData name="Stuk, Gabriel" userId="0dcd8a03-429e-4c00-815d-e55b3b91aae4" providerId="ADAL" clId="{C10656D0-27FC-43F5-BB27-37079F55FF2F}" dt="2024-09-16T13:35:31.843" v="2428" actId="26606"/>
-          <ac:spMkLst>
-            <pc:docMk/>
-            <pc:sldMk cId="1402053733" sldId="262"/>
-            <ac:spMk id="14" creationId="{F1D6E6C0-11C7-4A38-BD12-80741960B53C}"/>
-          </ac:spMkLst>
-        </pc:spChg>
-        <pc:spChg chg="add mod">
-          <ac:chgData name="Stuk, Gabriel" userId="0dcd8a03-429e-4c00-815d-e55b3b91aae4" providerId="ADAL" clId="{C10656D0-27FC-43F5-BB27-37079F55FF2F}" dt="2024-09-28T15:06:21.610" v="7101" actId="1076"/>
-          <ac:spMkLst>
-            <pc:docMk/>
-            <pc:sldMk cId="1402053733" sldId="262"/>
-            <ac:spMk id="32" creationId="{B6992BBB-5B6C-45AA-953A-C58F28C66E9F}"/>
-          </ac:spMkLst>
-        </pc:spChg>
-        <pc:grpChg chg="add del">
-          <ac:chgData name="Stuk, Gabriel" userId="0dcd8a03-429e-4c00-815d-e55b3b91aae4" providerId="ADAL" clId="{C10656D0-27FC-43F5-BB27-37079F55FF2F}" dt="2024-09-16T13:35:31.843" v="2428" actId="26606"/>
-          <ac:grpSpMkLst>
-            <pc:docMk/>
-            <pc:sldMk cId="1402053733" sldId="262"/>
-            <ac:grpSpMk id="16" creationId="{2B16E781-E64A-4007-B0F1-5A50135A4276}"/>
-          </ac:grpSpMkLst>
-        </pc:grpChg>
-        <pc:grpChg chg="add">
-          <ac:chgData name="Stuk, Gabriel" userId="0dcd8a03-429e-4c00-815d-e55b3b91aae4" providerId="ADAL" clId="{C10656D0-27FC-43F5-BB27-37079F55FF2F}" dt="2024-09-16T13:36:02.920" v="2431" actId="26606"/>
-          <ac:grpSpMkLst>
-            <pc:docMk/>
-            <pc:sldMk cId="1402053733" sldId="262"/>
-            <ac:grpSpMk id="18" creationId="{2B16E781-E64A-4007-B0F1-5A50135A4276}"/>
-          </ac:grpSpMkLst>
-        </pc:grpChg>
-        <pc:picChg chg="add del mod">
-          <ac:chgData name="Stuk, Gabriel" userId="0dcd8a03-429e-4c00-815d-e55b3b91aae4" providerId="ADAL" clId="{C10656D0-27FC-43F5-BB27-37079F55FF2F}" dt="2024-09-16T13:35:34.007" v="2429" actId="478"/>
-          <ac:picMkLst>
-            <pc:docMk/>
-            <pc:sldMk cId="1402053733" sldId="262"/>
-            <ac:picMk id="5" creationId="{B79488B6-E9B9-4C6A-06A2-41412EE29971}"/>
-          </ac:picMkLst>
-        </pc:picChg>
-        <pc:picChg chg="add mod">
-          <ac:chgData name="Stuk, Gabriel" userId="0dcd8a03-429e-4c00-815d-e55b3b91aae4" providerId="ADAL" clId="{C10656D0-27FC-43F5-BB27-37079F55FF2F}" dt="2024-09-16T13:36:04.514" v="2433" actId="962"/>
-          <ac:picMkLst>
-            <pc:docMk/>
-            <pc:sldMk cId="1402053733" sldId="262"/>
-            <ac:picMk id="7" creationId="{8B7E567C-EB60-63FE-F713-7EF4D98D8AC2}"/>
-          </ac:picMkLst>
-        </pc:picChg>
-        <pc:inkChg chg="add del">
-          <ac:chgData name="Stuk, Gabriel" userId="0dcd8a03-429e-4c00-815d-e55b3b91aae4" providerId="ADAL" clId="{C10656D0-27FC-43F5-BB27-37079F55FF2F}" dt="2024-09-16T13:43:19.248" v="3083" actId="9405"/>
-          <ac:inkMkLst>
-            <pc:docMk/>
-            <pc:sldMk cId="1402053733" sldId="262"/>
-            <ac:inkMk id="8" creationId="{0F3CBCCA-2C76-EC00-CB11-8DBB08F92CE0}"/>
-          </ac:inkMkLst>
-        </pc:inkChg>
-        <pc:inkChg chg="add del">
-          <ac:chgData name="Stuk, Gabriel" userId="0dcd8a03-429e-4c00-815d-e55b3b91aae4" providerId="ADAL" clId="{C10656D0-27FC-43F5-BB27-37079F55FF2F}" dt="2024-09-28T15:06:18.842" v="7100" actId="34122"/>
-          <ac:inkMkLst>
-            <pc:docMk/>
-            <pc:sldMk cId="1402053733" sldId="262"/>
-            <ac:inkMk id="15" creationId="{A4C5CC88-0ADF-9461-E830-75400A8D43BD}"/>
-          </ac:inkMkLst>
-        </pc:inkChg>
-      </pc:sldChg>
-      <pc:sldChg chg="addSp delSp modSp new mod setBg">
-        <pc:chgData name="Stuk, Gabriel" userId="0dcd8a03-429e-4c00-815d-e55b3b91aae4" providerId="ADAL" clId="{C10656D0-27FC-43F5-BB27-37079F55FF2F}" dt="2024-09-28T15:06:28.865" v="7103" actId="1076"/>
-        <pc:sldMkLst>
-          <pc:docMk/>
-          <pc:sldMk cId="3828729462" sldId="263"/>
-        </pc:sldMkLst>
-        <pc:spChg chg="mod">
-          <ac:chgData name="Stuk, Gabriel" userId="0dcd8a03-429e-4c00-815d-e55b3b91aae4" providerId="ADAL" clId="{C10656D0-27FC-43F5-BB27-37079F55FF2F}" dt="2024-09-16T13:40:13.873" v="3074" actId="26606"/>
-          <ac:spMkLst>
-            <pc:docMk/>
-            <pc:sldMk cId="3828729462" sldId="263"/>
-            <ac:spMk id="2" creationId="{E1EED05E-72B8-19FF-B52A-9A9FEAF947AE}"/>
-          </ac:spMkLst>
-        </pc:spChg>
-        <pc:spChg chg="mod">
-          <ac:chgData name="Stuk, Gabriel" userId="0dcd8a03-429e-4c00-815d-e55b3b91aae4" providerId="ADAL" clId="{C10656D0-27FC-43F5-BB27-37079F55FF2F}" dt="2024-09-16T13:40:13.873" v="3074" actId="26606"/>
-          <ac:spMkLst>
-            <pc:docMk/>
-            <pc:sldMk cId="3828729462" sldId="263"/>
-            <ac:spMk id="3" creationId="{3D41FC7A-ACAB-DB82-6F78-A80EBF91E49E}"/>
-          </ac:spMkLst>
-        </pc:spChg>
-        <pc:spChg chg="add">
-          <ac:chgData name="Stuk, Gabriel" userId="0dcd8a03-429e-4c00-815d-e55b3b91aae4" providerId="ADAL" clId="{C10656D0-27FC-43F5-BB27-37079F55FF2F}" dt="2024-09-16T13:40:13.873" v="3074" actId="26606"/>
-          <ac:spMkLst>
-            <pc:docMk/>
-            <pc:sldMk cId="3828729462" sldId="263"/>
-            <ac:spMk id="7" creationId="{4F8E18AC-903E-4B46-8CC0-FE20E612CE37}"/>
-          </ac:spMkLst>
-        </pc:spChg>
-        <pc:spChg chg="add">
-          <ac:chgData name="Stuk, Gabriel" userId="0dcd8a03-429e-4c00-815d-e55b3b91aae4" providerId="ADAL" clId="{C10656D0-27FC-43F5-BB27-37079F55FF2F}" dt="2024-09-16T13:40:13.873" v="3074" actId="26606"/>
-          <ac:spMkLst>
-            <pc:docMk/>
-            <pc:sldMk cId="3828729462" sldId="263"/>
-            <ac:spMk id="8" creationId="{3DEE38FB-0763-470C-8A5E-44456B5130D7}"/>
-          </ac:spMkLst>
-        </pc:spChg>
-        <pc:spChg chg="add">
-          <ac:chgData name="Stuk, Gabriel" userId="0dcd8a03-429e-4c00-815d-e55b3b91aae4" providerId="ADAL" clId="{C10656D0-27FC-43F5-BB27-37079F55FF2F}" dt="2024-09-16T13:40:13.873" v="3074" actId="26606"/>
-          <ac:spMkLst>
-            <pc:docMk/>
-            <pc:sldMk cId="3828729462" sldId="263"/>
-            <ac:spMk id="9" creationId="{F1D6E6C0-11C7-4A38-BD12-80741960B53C}"/>
-          </ac:spMkLst>
-        </pc:spChg>
-        <pc:spChg chg="add del">
-          <ac:chgData name="Stuk, Gabriel" userId="0dcd8a03-429e-4c00-815d-e55b3b91aae4" providerId="ADAL" clId="{C10656D0-27FC-43F5-BB27-37079F55FF2F}" dt="2024-09-16T13:40:05.676" v="3073" actId="26606"/>
-          <ac:spMkLst>
-            <pc:docMk/>
-            <pc:sldMk cId="3828729462" sldId="263"/>
-            <ac:spMk id="10" creationId="{4F8E18AC-903E-4B46-8CC0-FE20E612CE37}"/>
-          </ac:spMkLst>
-        </pc:spChg>
-        <pc:spChg chg="add del">
-          <ac:chgData name="Stuk, Gabriel" userId="0dcd8a03-429e-4c00-815d-e55b3b91aae4" providerId="ADAL" clId="{C10656D0-27FC-43F5-BB27-37079F55FF2F}" dt="2024-09-16T13:40:05.676" v="3073" actId="26606"/>
-          <ac:spMkLst>
-            <pc:docMk/>
-            <pc:sldMk cId="3828729462" sldId="263"/>
-            <ac:spMk id="12" creationId="{3DEE38FB-0763-470C-8A5E-44456B5130D7}"/>
-          </ac:spMkLst>
-        </pc:spChg>
-        <pc:spChg chg="add del">
-          <ac:chgData name="Stuk, Gabriel" userId="0dcd8a03-429e-4c00-815d-e55b3b91aae4" providerId="ADAL" clId="{C10656D0-27FC-43F5-BB27-37079F55FF2F}" dt="2024-09-16T13:40:05.676" v="3073" actId="26606"/>
-          <ac:spMkLst>
-            <pc:docMk/>
-            <pc:sldMk cId="3828729462" sldId="263"/>
-            <ac:spMk id="14" creationId="{F1D6E6C0-11C7-4A38-BD12-80741960B53C}"/>
-          </ac:spMkLst>
-        </pc:spChg>
-        <pc:spChg chg="add mod">
-          <ac:chgData name="Stuk, Gabriel" userId="0dcd8a03-429e-4c00-815d-e55b3b91aae4" providerId="ADAL" clId="{C10656D0-27FC-43F5-BB27-37079F55FF2F}" dt="2024-09-28T15:06:28.865" v="7103" actId="1076"/>
-          <ac:spMkLst>
-            <pc:docMk/>
-            <pc:sldMk cId="3828729462" sldId="263"/>
-            <ac:spMk id="32" creationId="{D10D662A-F31C-4785-B3EB-9EDDBD3646B3}"/>
-          </ac:spMkLst>
-        </pc:spChg>
-        <pc:grpChg chg="add">
-          <ac:chgData name="Stuk, Gabriel" userId="0dcd8a03-429e-4c00-815d-e55b3b91aae4" providerId="ADAL" clId="{C10656D0-27FC-43F5-BB27-37079F55FF2F}" dt="2024-09-16T13:40:13.873" v="3074" actId="26606"/>
-          <ac:grpSpMkLst>
-            <pc:docMk/>
-            <pc:sldMk cId="3828729462" sldId="263"/>
-            <ac:grpSpMk id="11" creationId="{2B16E781-E64A-4007-B0F1-5A50135A4276}"/>
-          </ac:grpSpMkLst>
-        </pc:grpChg>
-        <pc:grpChg chg="add del">
-          <ac:chgData name="Stuk, Gabriel" userId="0dcd8a03-429e-4c00-815d-e55b3b91aae4" providerId="ADAL" clId="{C10656D0-27FC-43F5-BB27-37079F55FF2F}" dt="2024-09-16T13:40:05.676" v="3073" actId="26606"/>
-          <ac:grpSpMkLst>
-            <pc:docMk/>
-            <pc:sldMk cId="3828729462" sldId="263"/>
-            <ac:grpSpMk id="16" creationId="{2B16E781-E64A-4007-B0F1-5A50135A4276}"/>
-          </ac:grpSpMkLst>
-        </pc:grpChg>
-        <pc:picChg chg="add mod">
-          <ac:chgData name="Stuk, Gabriel" userId="0dcd8a03-429e-4c00-815d-e55b3b91aae4" providerId="ADAL" clId="{C10656D0-27FC-43F5-BB27-37079F55FF2F}" dt="2024-09-16T13:40:29.857" v="3078" actId="14100"/>
-          <ac:picMkLst>
-            <pc:docMk/>
-            <pc:sldMk cId="3828729462" sldId="263"/>
-            <ac:picMk id="5" creationId="{48B10A11-B954-4A63-652D-07758D8542E0}"/>
-          </ac:picMkLst>
-        </pc:picChg>
-        <pc:inkChg chg="add del">
-          <ac:chgData name="Stuk, Gabriel" userId="0dcd8a03-429e-4c00-815d-e55b3b91aae4" providerId="ADAL" clId="{C10656D0-27FC-43F5-BB27-37079F55FF2F}" dt="2024-09-16T13:43:06.725" v="3080" actId="9405"/>
-          <ac:inkMkLst>
-            <pc:docMk/>
-            <pc:sldMk cId="3828729462" sldId="263"/>
-            <ac:inkMk id="6" creationId="{64AEFDC1-9EFA-BE0F-93E8-DB2A33126FC1}"/>
-          </ac:inkMkLst>
-        </pc:inkChg>
-        <pc:inkChg chg="add del">
-          <ac:chgData name="Stuk, Gabriel" userId="0dcd8a03-429e-4c00-815d-e55b3b91aae4" providerId="ADAL" clId="{C10656D0-27FC-43F5-BB27-37079F55FF2F}" dt="2024-09-28T15:06:26.315" v="7102" actId="34122"/>
-          <ac:inkMkLst>
-            <pc:docMk/>
-            <pc:sldMk cId="3828729462" sldId="263"/>
-            <ac:inkMk id="31" creationId="{BDC57B47-E2DF-6991-1CFC-725E3CC2B556}"/>
-          </ac:inkMkLst>
-        </pc:inkChg>
-      </pc:sldChg>
-      <pc:sldChg chg="addSp delSp modSp new mod setBg">
-        <pc:chgData name="Stuk, Gabriel" userId="0dcd8a03-429e-4c00-815d-e55b3b91aae4" providerId="ADAL" clId="{C10656D0-27FC-43F5-BB27-37079F55FF2F}" dt="2024-09-28T15:07:13.550" v="7112" actId="1076"/>
-        <pc:sldMkLst>
-          <pc:docMk/>
-          <pc:sldMk cId="2105718600" sldId="264"/>
-        </pc:sldMkLst>
-        <pc:spChg chg="mod">
-          <ac:chgData name="Stuk, Gabriel" userId="0dcd8a03-429e-4c00-815d-e55b3b91aae4" providerId="ADAL" clId="{C10656D0-27FC-43F5-BB27-37079F55FF2F}" dt="2024-09-16T13:47:31.210" v="3485" actId="26606"/>
-          <ac:spMkLst>
-            <pc:docMk/>
-            <pc:sldMk cId="2105718600" sldId="264"/>
-            <ac:spMk id="2" creationId="{0E6026C1-5D81-6E01-32C4-D7A6DAAFDBB0}"/>
-          </ac:spMkLst>
-        </pc:spChg>
-        <pc:spChg chg="mod">
-          <ac:chgData name="Stuk, Gabriel" userId="0dcd8a03-429e-4c00-815d-e55b3b91aae4" providerId="ADAL" clId="{C10656D0-27FC-43F5-BB27-37079F55FF2F}" dt="2024-09-16T14:18:23.658" v="3506" actId="20577"/>
-          <ac:spMkLst>
-            <pc:docMk/>
-            <pc:sldMk cId="2105718600" sldId="264"/>
-            <ac:spMk id="3" creationId="{C801EF38-C588-074C-73CB-E84A8FA21680}"/>
-          </ac:spMkLst>
-        </pc:spChg>
-        <pc:spChg chg="add del">
-          <ac:chgData name="Stuk, Gabriel" userId="0dcd8a03-429e-4c00-815d-e55b3b91aae4" providerId="ADAL" clId="{C10656D0-27FC-43F5-BB27-37079F55FF2F}" dt="2024-09-16T13:47:28.102" v="3480" actId="26606"/>
-          <ac:spMkLst>
-            <pc:docMk/>
-            <pc:sldMk cId="2105718600" sldId="264"/>
-            <ac:spMk id="10" creationId="{4F8E18AC-903E-4B46-8CC0-FE20E612CE37}"/>
-          </ac:spMkLst>
-        </pc:spChg>
-        <pc:spChg chg="add del">
-          <ac:chgData name="Stuk, Gabriel" userId="0dcd8a03-429e-4c00-815d-e55b3b91aae4" providerId="ADAL" clId="{C10656D0-27FC-43F5-BB27-37079F55FF2F}" dt="2024-09-16T13:47:28.102" v="3480" actId="26606"/>
-          <ac:spMkLst>
-            <pc:docMk/>
-            <pc:sldMk cId="2105718600" sldId="264"/>
-            <ac:spMk id="12" creationId="{3DEE38FB-0763-470C-8A5E-44456B5130D7}"/>
-          </ac:spMkLst>
-        </pc:spChg>
-        <pc:spChg chg="add mod">
-          <ac:chgData name="Stuk, Gabriel" userId="0dcd8a03-429e-4c00-815d-e55b3b91aae4" providerId="ADAL" clId="{C10656D0-27FC-43F5-BB27-37079F55FF2F}" dt="2024-09-28T15:07:13.550" v="7112" actId="1076"/>
-          <ac:spMkLst>
-            <pc:docMk/>
-            <pc:sldMk cId="2105718600" sldId="264"/>
-            <ac:spMk id="12" creationId="{674CCDED-761A-4CAC-B28C-B6A6B1BFD663}"/>
-          </ac:spMkLst>
-        </pc:spChg>
-        <pc:spChg chg="add del">
-          <ac:chgData name="Stuk, Gabriel" userId="0dcd8a03-429e-4c00-815d-e55b3b91aae4" providerId="ADAL" clId="{C10656D0-27FC-43F5-BB27-37079F55FF2F}" dt="2024-09-28T15:06:40.096" v="7105" actId="34122"/>
-          <ac:spMkLst>
-            <pc:docMk/>
-            <pc:sldMk cId="2105718600" sldId="264"/>
-            <ac:spMk id="12" creationId="{E01FA17B-065B-42A7-9FD3-3C79B0CE540F}"/>
-          </ac:spMkLst>
-        </pc:spChg>
-        <pc:spChg chg="add del">
-          <ac:chgData name="Stuk, Gabriel" userId="0dcd8a03-429e-4c00-815d-e55b3b91aae4" providerId="ADAL" clId="{C10656D0-27FC-43F5-BB27-37079F55FF2F}" dt="2024-09-16T13:47:28.102" v="3480" actId="26606"/>
-          <ac:spMkLst>
-            <pc:docMk/>
-            <pc:sldMk cId="2105718600" sldId="264"/>
-            <ac:spMk id="14" creationId="{F1D6E6C0-11C7-4A38-BD12-80741960B53C}"/>
-          </ac:spMkLst>
-        </pc:spChg>
-        <pc:spChg chg="add del">
-          <ac:chgData name="Stuk, Gabriel" userId="0dcd8a03-429e-4c00-815d-e55b3b91aae4" providerId="ADAL" clId="{C10656D0-27FC-43F5-BB27-37079F55FF2F}" dt="2024-09-16T13:47:30.459" v="3482" actId="26606"/>
-          <ac:spMkLst>
-            <pc:docMk/>
-            <pc:sldMk cId="2105718600" sldId="264"/>
-            <ac:spMk id="26" creationId="{458183E0-58D3-4C7F-97F0-2494113B38F6}"/>
-          </ac:spMkLst>
-        </pc:spChg>
-        <pc:spChg chg="add del">
-          <ac:chgData name="Stuk, Gabriel" userId="0dcd8a03-429e-4c00-815d-e55b3b91aae4" providerId="ADAL" clId="{C10656D0-27FC-43F5-BB27-37079F55FF2F}" dt="2024-09-16T13:47:30.459" v="3482" actId="26606"/>
-          <ac:spMkLst>
-            <pc:docMk/>
-            <pc:sldMk cId="2105718600" sldId="264"/>
-            <ac:spMk id="27" creationId="{493D7220-9A41-4B89-8A05-2E854925EDA1}"/>
-          </ac:spMkLst>
-        </pc:spChg>
-        <pc:spChg chg="add del">
-          <ac:chgData name="Stuk, Gabriel" userId="0dcd8a03-429e-4c00-815d-e55b3b91aae4" providerId="ADAL" clId="{C10656D0-27FC-43F5-BB27-37079F55FF2F}" dt="2024-09-16T13:47:31.199" v="3484" actId="26606"/>
-          <ac:spMkLst>
-            <pc:docMk/>
-            <pc:sldMk cId="2105718600" sldId="264"/>
-            <ac:spMk id="37" creationId="{BB4ECDFC-8958-4B83-B01F-58AEFB867BAF}"/>
-          </ac:spMkLst>
-        </pc:spChg>
-        <pc:spChg chg="add del">
-          <ac:chgData name="Stuk, Gabriel" userId="0dcd8a03-429e-4c00-815d-e55b3b91aae4" providerId="ADAL" clId="{C10656D0-27FC-43F5-BB27-37079F55FF2F}" dt="2024-09-16T13:47:31.199" v="3484" actId="26606"/>
-          <ac:spMkLst>
-            <pc:docMk/>
-            <pc:sldMk cId="2105718600" sldId="264"/>
-            <ac:spMk id="38" creationId="{C1D68778-F94A-4C5B-9118-3B992BB975DD}"/>
-          </ac:spMkLst>
-        </pc:spChg>
-        <pc:spChg chg="add">
-          <ac:chgData name="Stuk, Gabriel" userId="0dcd8a03-429e-4c00-815d-e55b3b91aae4" providerId="ADAL" clId="{C10656D0-27FC-43F5-BB27-37079F55FF2F}" dt="2024-09-16T13:47:31.210" v="3485" actId="26606"/>
-          <ac:spMkLst>
-            <pc:docMk/>
-            <pc:sldMk cId="2105718600" sldId="264"/>
-            <ac:spMk id="43" creationId="{4F8E18AC-903E-4B46-8CC0-FE20E612CE37}"/>
-          </ac:spMkLst>
-        </pc:spChg>
-        <pc:spChg chg="add">
-          <ac:chgData name="Stuk, Gabriel" userId="0dcd8a03-429e-4c00-815d-e55b3b91aae4" providerId="ADAL" clId="{C10656D0-27FC-43F5-BB27-37079F55FF2F}" dt="2024-09-16T13:47:31.210" v="3485" actId="26606"/>
-          <ac:spMkLst>
-            <pc:docMk/>
-            <pc:sldMk cId="2105718600" sldId="264"/>
-            <ac:spMk id="44" creationId="{3DEE38FB-0763-470C-8A5E-44456B5130D7}"/>
-          </ac:spMkLst>
-        </pc:spChg>
-        <pc:spChg chg="add">
-          <ac:chgData name="Stuk, Gabriel" userId="0dcd8a03-429e-4c00-815d-e55b3b91aae4" providerId="ADAL" clId="{C10656D0-27FC-43F5-BB27-37079F55FF2F}" dt="2024-09-16T13:47:31.210" v="3485" actId="26606"/>
-          <ac:spMkLst>
-            <pc:docMk/>
-            <pc:sldMk cId="2105718600" sldId="264"/>
-            <ac:spMk id="45" creationId="{F1D6E6C0-11C7-4A38-BD12-80741960B53C}"/>
-          </ac:spMkLst>
-        </pc:spChg>
-        <pc:grpChg chg="add del">
-          <ac:chgData name="Stuk, Gabriel" userId="0dcd8a03-429e-4c00-815d-e55b3b91aae4" providerId="ADAL" clId="{C10656D0-27FC-43F5-BB27-37079F55FF2F}" dt="2024-09-16T13:47:28.102" v="3480" actId="26606"/>
-          <ac:grpSpMkLst>
-            <pc:docMk/>
-            <pc:sldMk cId="2105718600" sldId="264"/>
-            <ac:grpSpMk id="16" creationId="{2B16E781-E64A-4007-B0F1-5A50135A4276}"/>
-          </ac:grpSpMkLst>
-        </pc:grpChg>
-        <pc:grpChg chg="add del">
-          <ac:chgData name="Stuk, Gabriel" userId="0dcd8a03-429e-4c00-815d-e55b3b91aae4" providerId="ADAL" clId="{C10656D0-27FC-43F5-BB27-37079F55FF2F}" dt="2024-09-16T13:47:30.459" v="3482" actId="26606"/>
-          <ac:grpSpMkLst>
-            <pc:docMk/>
-            <pc:sldMk cId="2105718600" sldId="264"/>
-            <ac:grpSpMk id="28" creationId="{C1F869AB-954B-4EAB-8260-60AE9C8D0C6F}"/>
-          </ac:grpSpMkLst>
-        </pc:grpChg>
-        <pc:grpChg chg="add del">
-          <ac:chgData name="Stuk, Gabriel" userId="0dcd8a03-429e-4c00-815d-e55b3b91aae4" providerId="ADAL" clId="{C10656D0-27FC-43F5-BB27-37079F55FF2F}" dt="2024-09-16T13:47:31.199" v="3484" actId="26606"/>
-          <ac:grpSpMkLst>
-            <pc:docMk/>
-            <pc:sldMk cId="2105718600" sldId="264"/>
-            <ac:grpSpMk id="39" creationId="{B29252B9-8F48-4CC0-A640-09C8A8C24E31}"/>
-          </ac:grpSpMkLst>
-        </pc:grpChg>
-        <pc:grpChg chg="add">
-          <ac:chgData name="Stuk, Gabriel" userId="0dcd8a03-429e-4c00-815d-e55b3b91aae4" providerId="ADAL" clId="{C10656D0-27FC-43F5-BB27-37079F55FF2F}" dt="2024-09-16T13:47:31.210" v="3485" actId="26606"/>
-          <ac:grpSpMkLst>
-            <pc:docMk/>
-            <pc:sldMk cId="2105718600" sldId="264"/>
-            <ac:grpSpMk id="46" creationId="{2B16E781-E64A-4007-B0F1-5A50135A4276}"/>
-          </ac:grpSpMkLst>
-        </pc:grpChg>
-        <pc:picChg chg="add mod ord">
-          <ac:chgData name="Stuk, Gabriel" userId="0dcd8a03-429e-4c00-815d-e55b3b91aae4" providerId="ADAL" clId="{C10656D0-27FC-43F5-BB27-37079F55FF2F}" dt="2024-09-16T13:47:38.736" v="3488" actId="14100"/>
-          <ac:picMkLst>
-            <pc:docMk/>
-            <pc:sldMk cId="2105718600" sldId="264"/>
-            <ac:picMk id="5" creationId="{4AD354EF-70E5-FE9A-802A-09ED57AF381B}"/>
-          </ac:picMkLst>
-        </pc:picChg>
-        <pc:inkChg chg="add del">
-          <ac:chgData name="Stuk, Gabriel" userId="0dcd8a03-429e-4c00-815d-e55b3b91aae4" providerId="ADAL" clId="{C10656D0-27FC-43F5-BB27-37079F55FF2F}" dt="2024-09-28T15:06:41.717" v="7106" actId="34122"/>
-          <ac:inkMkLst>
-            <pc:docMk/>
-            <pc:sldMk cId="2105718600" sldId="264"/>
-            <ac:inkMk id="6" creationId="{F00E1792-1BBE-EDAB-A632-71649BE33A66}"/>
-          </ac:inkMkLst>
-        </pc:inkChg>
-      </pc:sldChg>
-      <pc:sldChg chg="addSp delSp modSp new mod">
-        <pc:chgData name="Stuk, Gabriel" userId="0dcd8a03-429e-4c00-815d-e55b3b91aae4" providerId="ADAL" clId="{C10656D0-27FC-43F5-BB27-37079F55FF2F}" dt="2024-09-28T15:13:57.689" v="7117" actId="207"/>
-        <pc:sldMkLst>
-          <pc:docMk/>
-          <pc:sldMk cId="2644009215" sldId="265"/>
-        </pc:sldMkLst>
-        <pc:spChg chg="mod">
-          <ac:chgData name="Stuk, Gabriel" userId="0dcd8a03-429e-4c00-815d-e55b3b91aae4" providerId="ADAL" clId="{C10656D0-27FC-43F5-BB27-37079F55FF2F}" dt="2024-09-16T14:21:36.816" v="3533" actId="20577"/>
-          <ac:spMkLst>
-            <pc:docMk/>
-            <pc:sldMk cId="2644009215" sldId="265"/>
-            <ac:spMk id="2" creationId="{92D45F20-18C6-3D26-0E31-EFAC177FE2CF}"/>
-          </ac:spMkLst>
-        </pc:spChg>
-        <pc:spChg chg="mod">
-          <ac:chgData name="Stuk, Gabriel" userId="0dcd8a03-429e-4c00-815d-e55b3b91aae4" providerId="ADAL" clId="{C10656D0-27FC-43F5-BB27-37079F55FF2F}" dt="2024-09-22T16:43:12.380" v="7090" actId="20577"/>
-          <ac:spMkLst>
-            <pc:docMk/>
-            <pc:sldMk cId="2644009215" sldId="265"/>
-            <ac:spMk id="3" creationId="{DA6379E7-ECC6-2651-5DAF-2CFD0F194A3C}"/>
-          </ac:spMkLst>
-        </pc:spChg>
-        <pc:spChg chg="add mod">
-          <ac:chgData name="Stuk, Gabriel" userId="0dcd8a03-429e-4c00-815d-e55b3b91aae4" providerId="ADAL" clId="{C10656D0-27FC-43F5-BB27-37079F55FF2F}" dt="2024-09-28T15:13:57.689" v="7117" actId="207"/>
-          <ac:spMkLst>
-            <pc:docMk/>
-            <pc:sldMk cId="2644009215" sldId="265"/>
-            <ac:spMk id="12" creationId="{4D887CCE-4822-4137-AADE-69D574259091}"/>
-          </ac:spMkLst>
-        </pc:spChg>
-        <pc:picChg chg="add mod">
-          <ac:chgData name="Stuk, Gabriel" userId="0dcd8a03-429e-4c00-815d-e55b3b91aae4" providerId="ADAL" clId="{C10656D0-27FC-43F5-BB27-37079F55FF2F}" dt="2024-09-16T14:31:10.808" v="4654" actId="1076"/>
-          <ac:picMkLst>
-            <pc:docMk/>
-            <pc:sldMk cId="2644009215" sldId="265"/>
-            <ac:picMk id="5" creationId="{8AFCBD4E-5F81-7769-4670-105EBFCD24D1}"/>
-          </ac:picMkLst>
-        </pc:picChg>
-        <pc:inkChg chg="add del">
-          <ac:chgData name="Stuk, Gabriel" userId="0dcd8a03-429e-4c00-815d-e55b3b91aae4" providerId="ADAL" clId="{C10656D0-27FC-43F5-BB27-37079F55FF2F}" dt="2024-09-28T15:13:37.058" v="7113" actId="34122"/>
-          <ac:inkMkLst>
-            <pc:docMk/>
-            <pc:sldMk cId="2644009215" sldId="265"/>
-            <ac:inkMk id="6" creationId="{23DEA2BC-7ACD-F43E-A695-E392C7E5A128}"/>
-          </ac:inkMkLst>
-        </pc:inkChg>
-      </pc:sldChg>
-      <pc:sldChg chg="modSp new del mod">
-        <pc:chgData name="Stuk, Gabriel" userId="0dcd8a03-429e-4c00-815d-e55b3b91aae4" providerId="ADAL" clId="{C10656D0-27FC-43F5-BB27-37079F55FF2F}" dt="2024-09-16T14:38:43.185" v="5491" actId="47"/>
-        <pc:sldMkLst>
-          <pc:docMk/>
-          <pc:sldMk cId="4018061688" sldId="266"/>
-        </pc:sldMkLst>
-        <pc:spChg chg="mod">
-          <ac:chgData name="Stuk, Gabriel" userId="0dcd8a03-429e-4c00-815d-e55b3b91aae4" providerId="ADAL" clId="{C10656D0-27FC-43F5-BB27-37079F55FF2F}" dt="2024-09-16T14:33:42.213" v="4679" actId="20577"/>
-          <ac:spMkLst>
-            <pc:docMk/>
-            <pc:sldMk cId="4018061688" sldId="266"/>
-            <ac:spMk id="2" creationId="{A9C96E6F-B310-1E24-57DF-7E362C15DE3E}"/>
-          </ac:spMkLst>
-        </pc:spChg>
-        <pc:spChg chg="mod">
-          <ac:chgData name="Stuk, Gabriel" userId="0dcd8a03-429e-4c00-815d-e55b3b91aae4" providerId="ADAL" clId="{C10656D0-27FC-43F5-BB27-37079F55FF2F}" dt="2024-09-16T14:35:35.608" v="4981" actId="20577"/>
-          <ac:spMkLst>
-            <pc:docMk/>
-            <pc:sldMk cId="4018061688" sldId="266"/>
-            <ac:spMk id="3" creationId="{D3E6A2EA-7B2D-9E59-B795-B69891821850}"/>
-          </ac:spMkLst>
-        </pc:spChg>
-      </pc:sldChg>
-      <pc:sldChg chg="addSp modSp new mod setBg">
-        <pc:chgData name="Stuk, Gabriel" userId="0dcd8a03-429e-4c00-815d-e55b3b91aae4" providerId="ADAL" clId="{C10656D0-27FC-43F5-BB27-37079F55FF2F}" dt="2024-09-16T14:39:13.429" v="5495" actId="962"/>
-        <pc:sldMkLst>
-          <pc:docMk/>
-          <pc:sldMk cId="4147665023" sldId="267"/>
-        </pc:sldMkLst>
-        <pc:spChg chg="mod">
-          <ac:chgData name="Stuk, Gabriel" userId="0dcd8a03-429e-4c00-815d-e55b3b91aae4" providerId="ADAL" clId="{C10656D0-27FC-43F5-BB27-37079F55FF2F}" dt="2024-09-16T14:39:11.772" v="5493" actId="26606"/>
-          <ac:spMkLst>
-            <pc:docMk/>
-            <pc:sldMk cId="4147665023" sldId="267"/>
-            <ac:spMk id="2" creationId="{19930872-AE98-8E8C-6CB1-894996BD7FDD}"/>
-          </ac:spMkLst>
-        </pc:spChg>
-        <pc:spChg chg="mod">
-          <ac:chgData name="Stuk, Gabriel" userId="0dcd8a03-429e-4c00-815d-e55b3b91aae4" providerId="ADAL" clId="{C10656D0-27FC-43F5-BB27-37079F55FF2F}" dt="2024-09-16T14:39:11.772" v="5493" actId="26606"/>
-          <ac:spMkLst>
-            <pc:docMk/>
-            <pc:sldMk cId="4147665023" sldId="267"/>
-            <ac:spMk id="3" creationId="{128B73CD-8CED-B85E-A0C1-674C445E502B}"/>
-          </ac:spMkLst>
-        </pc:spChg>
-        <pc:spChg chg="add">
-          <ac:chgData name="Stuk, Gabriel" userId="0dcd8a03-429e-4c00-815d-e55b3b91aae4" providerId="ADAL" clId="{C10656D0-27FC-43F5-BB27-37079F55FF2F}" dt="2024-09-16T14:39:11.772" v="5493" actId="26606"/>
-          <ac:spMkLst>
-            <pc:docMk/>
-            <pc:sldMk cId="4147665023" sldId="267"/>
-            <ac:spMk id="10" creationId="{4F8E18AC-903E-4B46-8CC0-FE20E612CE37}"/>
-          </ac:spMkLst>
-        </pc:spChg>
-        <pc:spChg chg="add">
-          <ac:chgData name="Stuk, Gabriel" userId="0dcd8a03-429e-4c00-815d-e55b3b91aae4" providerId="ADAL" clId="{C10656D0-27FC-43F5-BB27-37079F55FF2F}" dt="2024-09-16T14:39:11.772" v="5493" actId="26606"/>
-          <ac:spMkLst>
-            <pc:docMk/>
-            <pc:sldMk cId="4147665023" sldId="267"/>
-            <ac:spMk id="12" creationId="{3DEE38FB-0763-470C-8A5E-44456B5130D7}"/>
-          </ac:spMkLst>
-        </pc:spChg>
-        <pc:spChg chg="add">
-          <ac:chgData name="Stuk, Gabriel" userId="0dcd8a03-429e-4c00-815d-e55b3b91aae4" providerId="ADAL" clId="{C10656D0-27FC-43F5-BB27-37079F55FF2F}" dt="2024-09-16T14:39:11.772" v="5493" actId="26606"/>
-          <ac:spMkLst>
-            <pc:docMk/>
-            <pc:sldMk cId="4147665023" sldId="267"/>
-            <ac:spMk id="14" creationId="{F1D6E6C0-11C7-4A38-BD12-80741960B53C}"/>
-          </ac:spMkLst>
-        </pc:spChg>
-        <pc:grpChg chg="add">
-          <ac:chgData name="Stuk, Gabriel" userId="0dcd8a03-429e-4c00-815d-e55b3b91aae4" providerId="ADAL" clId="{C10656D0-27FC-43F5-BB27-37079F55FF2F}" dt="2024-09-16T14:39:11.772" v="5493" actId="26606"/>
-          <ac:grpSpMkLst>
-            <pc:docMk/>
-            <pc:sldMk cId="4147665023" sldId="267"/>
-            <ac:grpSpMk id="16" creationId="{2B16E781-E64A-4007-B0F1-5A50135A4276}"/>
-          </ac:grpSpMkLst>
-        </pc:grpChg>
-        <pc:picChg chg="add mod">
-          <ac:chgData name="Stuk, Gabriel" userId="0dcd8a03-429e-4c00-815d-e55b3b91aae4" providerId="ADAL" clId="{C10656D0-27FC-43F5-BB27-37079F55FF2F}" dt="2024-09-16T14:39:13.429" v="5495" actId="962"/>
-          <ac:picMkLst>
-            <pc:docMk/>
-            <pc:sldMk cId="4147665023" sldId="267"/>
-            <ac:picMk id="5" creationId="{8461B9CC-AFDA-538E-8EED-CE1FD64C8513}"/>
-          </ac:picMkLst>
-        </pc:picChg>
-      </pc:sldChg>
-      <pc:sldChg chg="addSp delSp modSp new mod setBg">
-        <pc:chgData name="Stuk, Gabriel" userId="0dcd8a03-429e-4c00-815d-e55b3b91aae4" providerId="ADAL" clId="{C10656D0-27FC-43F5-BB27-37079F55FF2F}" dt="2024-09-16T14:46:25.897" v="6015" actId="14100"/>
-        <pc:sldMkLst>
-          <pc:docMk/>
-          <pc:sldMk cId="588260971" sldId="268"/>
-        </pc:sldMkLst>
-        <pc:spChg chg="mod">
-          <ac:chgData name="Stuk, Gabriel" userId="0dcd8a03-429e-4c00-815d-e55b3b91aae4" providerId="ADAL" clId="{C10656D0-27FC-43F5-BB27-37079F55FF2F}" dt="2024-09-16T14:46:23.583" v="6014" actId="26606"/>
-          <ac:spMkLst>
-            <pc:docMk/>
-            <pc:sldMk cId="588260971" sldId="268"/>
-            <ac:spMk id="2" creationId="{80F71B6A-7780-10B9-E2D1-0330EA8EB3B8}"/>
-          </ac:spMkLst>
-        </pc:spChg>
-        <pc:spChg chg="mod">
-          <ac:chgData name="Stuk, Gabriel" userId="0dcd8a03-429e-4c00-815d-e55b3b91aae4" providerId="ADAL" clId="{C10656D0-27FC-43F5-BB27-37079F55FF2F}" dt="2024-09-16T14:46:23.583" v="6014" actId="26606"/>
-          <ac:spMkLst>
-            <pc:docMk/>
-            <pc:sldMk cId="588260971" sldId="268"/>
-            <ac:spMk id="3" creationId="{358A2815-64A9-5483-EAC3-8A6A853B9358}"/>
-          </ac:spMkLst>
-        </pc:spChg>
-        <pc:spChg chg="add del">
-          <ac:chgData name="Stuk, Gabriel" userId="0dcd8a03-429e-4c00-815d-e55b3b91aae4" providerId="ADAL" clId="{C10656D0-27FC-43F5-BB27-37079F55FF2F}" dt="2024-09-16T14:46:00.893" v="6009" actId="26606"/>
-          <ac:spMkLst>
-            <pc:docMk/>
-            <pc:sldMk cId="588260971" sldId="268"/>
-            <ac:spMk id="10" creationId="{4F8E18AC-903E-4B46-8CC0-FE20E612CE37}"/>
-          </ac:spMkLst>
-        </pc:spChg>
-        <pc:spChg chg="add">
-          <ac:chgData name="Stuk, Gabriel" userId="0dcd8a03-429e-4c00-815d-e55b3b91aae4" providerId="ADAL" clId="{C10656D0-27FC-43F5-BB27-37079F55FF2F}" dt="2024-09-16T14:46:23.583" v="6014" actId="26606"/>
-          <ac:spMkLst>
-            <pc:docMk/>
-            <pc:sldMk cId="588260971" sldId="268"/>
-            <ac:spMk id="11" creationId="{4F8E18AC-903E-4B46-8CC0-FE20E612CE37}"/>
-          </ac:spMkLst>
-        </pc:spChg>
-        <pc:spChg chg="add del">
-          <ac:chgData name="Stuk, Gabriel" userId="0dcd8a03-429e-4c00-815d-e55b3b91aae4" providerId="ADAL" clId="{C10656D0-27FC-43F5-BB27-37079F55FF2F}" dt="2024-09-16T14:46:00.893" v="6009" actId="26606"/>
-          <ac:spMkLst>
-            <pc:docMk/>
-            <pc:sldMk cId="588260971" sldId="268"/>
-            <ac:spMk id="12" creationId="{3DEE38FB-0763-470C-8A5E-44456B5130D7}"/>
-          </ac:spMkLst>
-        </pc:spChg>
-        <pc:spChg chg="add">
-          <ac:chgData name="Stuk, Gabriel" userId="0dcd8a03-429e-4c00-815d-e55b3b91aae4" providerId="ADAL" clId="{C10656D0-27FC-43F5-BB27-37079F55FF2F}" dt="2024-09-16T14:46:23.583" v="6014" actId="26606"/>
-          <ac:spMkLst>
-            <pc:docMk/>
-            <pc:sldMk cId="588260971" sldId="268"/>
-            <ac:spMk id="13" creationId="{3DEE38FB-0763-470C-8A5E-44456B5130D7}"/>
-          </ac:spMkLst>
-        </pc:spChg>
-        <pc:spChg chg="add del">
-          <ac:chgData name="Stuk, Gabriel" userId="0dcd8a03-429e-4c00-815d-e55b3b91aae4" providerId="ADAL" clId="{C10656D0-27FC-43F5-BB27-37079F55FF2F}" dt="2024-09-16T14:46:00.893" v="6009" actId="26606"/>
-          <ac:spMkLst>
-            <pc:docMk/>
-            <pc:sldMk cId="588260971" sldId="268"/>
-            <ac:spMk id="14" creationId="{F1D6E6C0-11C7-4A38-BD12-80741960B53C}"/>
-          </ac:spMkLst>
-        </pc:spChg>
-        <pc:spChg chg="add">
-          <ac:chgData name="Stuk, Gabriel" userId="0dcd8a03-429e-4c00-815d-e55b3b91aae4" providerId="ADAL" clId="{C10656D0-27FC-43F5-BB27-37079F55FF2F}" dt="2024-09-16T14:46:23.583" v="6014" actId="26606"/>
-          <ac:spMkLst>
-            <pc:docMk/>
-            <pc:sldMk cId="588260971" sldId="268"/>
-            <ac:spMk id="18" creationId="{F1D6E6C0-11C7-4A38-BD12-80741960B53C}"/>
-          </ac:spMkLst>
-        </pc:spChg>
-        <pc:grpChg chg="add del">
-          <ac:chgData name="Stuk, Gabriel" userId="0dcd8a03-429e-4c00-815d-e55b3b91aae4" providerId="ADAL" clId="{C10656D0-27FC-43F5-BB27-37079F55FF2F}" dt="2024-09-16T14:46:00.893" v="6009" actId="26606"/>
-          <ac:grpSpMkLst>
-            <pc:docMk/>
-            <pc:sldMk cId="588260971" sldId="268"/>
-            <ac:grpSpMk id="16" creationId="{2B16E781-E64A-4007-B0F1-5A50135A4276}"/>
-          </ac:grpSpMkLst>
-        </pc:grpChg>
-        <pc:grpChg chg="add">
-          <ac:chgData name="Stuk, Gabriel" userId="0dcd8a03-429e-4c00-815d-e55b3b91aae4" providerId="ADAL" clId="{C10656D0-27FC-43F5-BB27-37079F55FF2F}" dt="2024-09-16T14:46:23.583" v="6014" actId="26606"/>
-          <ac:grpSpMkLst>
-            <pc:docMk/>
-            <pc:sldMk cId="588260971" sldId="268"/>
-            <ac:grpSpMk id="20" creationId="{2B16E781-E64A-4007-B0F1-5A50135A4276}"/>
-          </ac:grpSpMkLst>
-        </pc:grpChg>
-        <pc:picChg chg="add del mod">
-          <ac:chgData name="Stuk, Gabriel" userId="0dcd8a03-429e-4c00-815d-e55b3b91aae4" providerId="ADAL" clId="{C10656D0-27FC-43F5-BB27-37079F55FF2F}" dt="2024-09-16T14:46:01.918" v="6010" actId="478"/>
-          <ac:picMkLst>
-            <pc:docMk/>
-            <pc:sldMk cId="588260971" sldId="268"/>
-            <ac:picMk id="5" creationId="{7E11A27F-A26D-263E-D0D5-112F0BC203CC}"/>
-          </ac:picMkLst>
-        </pc:picChg>
-        <pc:picChg chg="add del">
-          <ac:chgData name="Stuk, Gabriel" userId="0dcd8a03-429e-4c00-815d-e55b3b91aae4" providerId="ADAL" clId="{C10656D0-27FC-43F5-BB27-37079F55FF2F}" dt="2024-09-16T14:46:16.908" v="6012" actId="478"/>
-          <ac:picMkLst>
-            <pc:docMk/>
-            <pc:sldMk cId="588260971" sldId="268"/>
-            <ac:picMk id="7" creationId="{E4CBE45A-96FA-B725-AE77-48231DF6B36A}"/>
-          </ac:picMkLst>
-        </pc:picChg>
-        <pc:picChg chg="add mod">
-          <ac:chgData name="Stuk, Gabriel" userId="0dcd8a03-429e-4c00-815d-e55b3b91aae4" providerId="ADAL" clId="{C10656D0-27FC-43F5-BB27-37079F55FF2F}" dt="2024-09-16T14:46:25.897" v="6015" actId="14100"/>
-          <ac:picMkLst>
-            <pc:docMk/>
-            <pc:sldMk cId="588260971" sldId="268"/>
-            <ac:picMk id="9" creationId="{59AF54EC-BCFE-1BC4-164C-4090DD5E18A0}"/>
-          </ac:picMkLst>
-        </pc:picChg>
-      </pc:sldChg>
-      <pc:sldChg chg="addSp delSp modSp new mod setBg">
-        <pc:chgData name="Stuk, Gabriel" userId="0dcd8a03-429e-4c00-815d-e55b3b91aae4" providerId="ADAL" clId="{C10656D0-27FC-43F5-BB27-37079F55FF2F}" dt="2024-09-16T21:55:54.802" v="6402" actId="20577"/>
-        <pc:sldMkLst>
-          <pc:docMk/>
-          <pc:sldMk cId="955722205" sldId="269"/>
-        </pc:sldMkLst>
-        <pc:spChg chg="mod">
-          <ac:chgData name="Stuk, Gabriel" userId="0dcd8a03-429e-4c00-815d-e55b3b91aae4" providerId="ADAL" clId="{C10656D0-27FC-43F5-BB27-37079F55FF2F}" dt="2024-09-16T21:47:54.760" v="6345" actId="26606"/>
-          <ac:spMkLst>
-            <pc:docMk/>
-            <pc:sldMk cId="955722205" sldId="269"/>
-            <ac:spMk id="2" creationId="{E932A363-3768-5CC5-4145-AC1E4957DFC6}"/>
-          </ac:spMkLst>
-        </pc:spChg>
-        <pc:spChg chg="mod">
-          <ac:chgData name="Stuk, Gabriel" userId="0dcd8a03-429e-4c00-815d-e55b3b91aae4" providerId="ADAL" clId="{C10656D0-27FC-43F5-BB27-37079F55FF2F}" dt="2024-09-16T21:55:54.802" v="6402" actId="20577"/>
-          <ac:spMkLst>
-            <pc:docMk/>
-            <pc:sldMk cId="955722205" sldId="269"/>
-            <ac:spMk id="3" creationId="{4AE429D5-CAF1-6B16-A071-33562D3C50DC}"/>
-          </ac:spMkLst>
-        </pc:spChg>
-        <pc:spChg chg="add del">
-          <ac:chgData name="Stuk, Gabriel" userId="0dcd8a03-429e-4c00-815d-e55b3b91aae4" providerId="ADAL" clId="{C10656D0-27FC-43F5-BB27-37079F55FF2F}" dt="2024-09-16T21:49:25.442" v="6351" actId="26606"/>
-          <ac:spMkLst>
-            <pc:docMk/>
-            <pc:sldMk cId="955722205" sldId="269"/>
-            <ac:spMk id="10" creationId="{4F8E18AC-903E-4B46-8CC0-FE20E612CE37}"/>
-          </ac:spMkLst>
-        </pc:spChg>
-        <pc:spChg chg="add del">
-          <ac:chgData name="Stuk, Gabriel" userId="0dcd8a03-429e-4c00-815d-e55b3b91aae4" providerId="ADAL" clId="{C10656D0-27FC-43F5-BB27-37079F55FF2F}" dt="2024-09-16T21:49:25.442" v="6351" actId="26606"/>
-          <ac:spMkLst>
-            <pc:docMk/>
-            <pc:sldMk cId="955722205" sldId="269"/>
-            <ac:spMk id="12" creationId="{3DEE38FB-0763-470C-8A5E-44456B5130D7}"/>
-          </ac:spMkLst>
-        </pc:spChg>
-        <pc:spChg chg="add del">
-          <ac:chgData name="Stuk, Gabriel" userId="0dcd8a03-429e-4c00-815d-e55b3b91aae4" providerId="ADAL" clId="{C10656D0-27FC-43F5-BB27-37079F55FF2F}" dt="2024-09-16T21:49:25.442" v="6351" actId="26606"/>
-          <ac:spMkLst>
-            <pc:docMk/>
-            <pc:sldMk cId="955722205" sldId="269"/>
-            <ac:spMk id="14" creationId="{F1D6E6C0-11C7-4A38-BD12-80741960B53C}"/>
-          </ac:spMkLst>
-        </pc:spChg>
-        <pc:spChg chg="add">
-          <ac:chgData name="Stuk, Gabriel" userId="0dcd8a03-429e-4c00-815d-e55b3b91aae4" providerId="ADAL" clId="{C10656D0-27FC-43F5-BB27-37079F55FF2F}" dt="2024-09-16T21:49:25.442" v="6351" actId="26606"/>
-          <ac:spMkLst>
-            <pc:docMk/>
-            <pc:sldMk cId="955722205" sldId="269"/>
-            <ac:spMk id="29" creationId="{4F8E18AC-903E-4B46-8CC0-FE20E612CE37}"/>
-          </ac:spMkLst>
-        </pc:spChg>
-        <pc:spChg chg="add">
-          <ac:chgData name="Stuk, Gabriel" userId="0dcd8a03-429e-4c00-815d-e55b3b91aae4" providerId="ADAL" clId="{C10656D0-27FC-43F5-BB27-37079F55FF2F}" dt="2024-09-16T21:49:25.442" v="6351" actId="26606"/>
-          <ac:spMkLst>
-            <pc:docMk/>
-            <pc:sldMk cId="955722205" sldId="269"/>
-            <ac:spMk id="31" creationId="{3DEE38FB-0763-470C-8A5E-44456B5130D7}"/>
-          </ac:spMkLst>
-        </pc:spChg>
-        <pc:spChg chg="add">
-          <ac:chgData name="Stuk, Gabriel" userId="0dcd8a03-429e-4c00-815d-e55b3b91aae4" providerId="ADAL" clId="{C10656D0-27FC-43F5-BB27-37079F55FF2F}" dt="2024-09-16T21:49:25.442" v="6351" actId="26606"/>
-          <ac:spMkLst>
-            <pc:docMk/>
-            <pc:sldMk cId="955722205" sldId="269"/>
-            <ac:spMk id="33" creationId="{F1D6E6C0-11C7-4A38-BD12-80741960B53C}"/>
-          </ac:spMkLst>
-        </pc:spChg>
-        <pc:grpChg chg="add del">
-          <ac:chgData name="Stuk, Gabriel" userId="0dcd8a03-429e-4c00-815d-e55b3b91aae4" providerId="ADAL" clId="{C10656D0-27FC-43F5-BB27-37079F55FF2F}" dt="2024-09-16T21:49:25.442" v="6351" actId="26606"/>
-          <ac:grpSpMkLst>
-            <pc:docMk/>
-            <pc:sldMk cId="955722205" sldId="269"/>
-            <ac:grpSpMk id="16" creationId="{2B16E781-E64A-4007-B0F1-5A50135A4276}"/>
-          </ac:grpSpMkLst>
-        </pc:grpChg>
-        <pc:grpChg chg="add">
-          <ac:chgData name="Stuk, Gabriel" userId="0dcd8a03-429e-4c00-815d-e55b3b91aae4" providerId="ADAL" clId="{C10656D0-27FC-43F5-BB27-37079F55FF2F}" dt="2024-09-16T21:49:25.442" v="6351" actId="26606"/>
-          <ac:grpSpMkLst>
-            <pc:docMk/>
-            <pc:sldMk cId="955722205" sldId="269"/>
-            <ac:grpSpMk id="35" creationId="{2B16E781-E64A-4007-B0F1-5A50135A4276}"/>
-          </ac:grpSpMkLst>
-        </pc:grpChg>
-        <pc:picChg chg="add del mod">
-          <ac:chgData name="Stuk, Gabriel" userId="0dcd8a03-429e-4c00-815d-e55b3b91aae4" providerId="ADAL" clId="{C10656D0-27FC-43F5-BB27-37079F55FF2F}" dt="2024-09-16T21:49:13.171" v="6349" actId="478"/>
-          <ac:picMkLst>
-            <pc:docMk/>
-            <pc:sldMk cId="955722205" sldId="269"/>
-            <ac:picMk id="5" creationId="{BF92CA8C-A467-DC99-5531-B31FC849D54B}"/>
-          </ac:picMkLst>
-        </pc:picChg>
-        <pc:picChg chg="add mod">
-          <ac:chgData name="Stuk, Gabriel" userId="0dcd8a03-429e-4c00-815d-e55b3b91aae4" providerId="ADAL" clId="{C10656D0-27FC-43F5-BB27-37079F55FF2F}" dt="2024-09-16T21:49:28.705" v="6354" actId="14100"/>
-          <ac:picMkLst>
-            <pc:docMk/>
-            <pc:sldMk cId="955722205" sldId="269"/>
-            <ac:picMk id="7" creationId="{9E74EFDC-E356-7C3E-9124-9B2BF08BEDE6}"/>
-          </ac:picMkLst>
-        </pc:picChg>
-      </pc:sldChg>
-      <pc:sldChg chg="new del">
-        <pc:chgData name="Stuk, Gabriel" userId="0dcd8a03-429e-4c00-815d-e55b3b91aae4" providerId="ADAL" clId="{C10656D0-27FC-43F5-BB27-37079F55FF2F}" dt="2024-09-16T21:50:39.300" v="6356" actId="47"/>
-        <pc:sldMkLst>
-          <pc:docMk/>
-          <pc:sldMk cId="1472751216" sldId="270"/>
-        </pc:sldMkLst>
-      </pc:sldChg>
-      <pc:sldChg chg="addSp delSp modSp new mod">
-        <pc:chgData name="Stuk, Gabriel" userId="0dcd8a03-429e-4c00-815d-e55b3b91aae4" providerId="ADAL" clId="{C10656D0-27FC-43F5-BB27-37079F55FF2F}" dt="2024-09-16T23:03:03.589" v="6957" actId="14100"/>
-        <pc:sldMkLst>
-          <pc:docMk/>
-          <pc:sldMk cId="2244053879" sldId="270"/>
-        </pc:sldMkLst>
-        <pc:spChg chg="mod">
-          <ac:chgData name="Stuk, Gabriel" userId="0dcd8a03-429e-4c00-815d-e55b3b91aae4" providerId="ADAL" clId="{C10656D0-27FC-43F5-BB27-37079F55FF2F}" dt="2024-09-16T22:55:20.628" v="6469" actId="1076"/>
-          <ac:spMkLst>
-            <pc:docMk/>
-            <pc:sldMk cId="2244053879" sldId="270"/>
-            <ac:spMk id="2" creationId="{188EFA9E-C41E-F1DA-041D-10D24040E8D2}"/>
-          </ac:spMkLst>
-        </pc:spChg>
-        <pc:spChg chg="del mod">
-          <ac:chgData name="Stuk, Gabriel" userId="0dcd8a03-429e-4c00-815d-e55b3b91aae4" providerId="ADAL" clId="{C10656D0-27FC-43F5-BB27-37079F55FF2F}" dt="2024-09-16T22:03:39.253" v="6462" actId="478"/>
-          <ac:spMkLst>
-            <pc:docMk/>
-            <pc:sldMk cId="2244053879" sldId="270"/>
-            <ac:spMk id="3" creationId="{A1BF8B27-5229-EAB3-79B2-DDCF0E34190D}"/>
-          </ac:spMkLst>
-        </pc:spChg>
-        <pc:picChg chg="add del mod">
-          <ac:chgData name="Stuk, Gabriel" userId="0dcd8a03-429e-4c00-815d-e55b3b91aae4" providerId="ADAL" clId="{C10656D0-27FC-43F5-BB27-37079F55FF2F}" dt="2024-09-16T23:02:00.083" v="6946" actId="478"/>
-          <ac:picMkLst>
-            <pc:docMk/>
-            <pc:sldMk cId="2244053879" sldId="270"/>
-            <ac:picMk id="5" creationId="{73D7D863-C18B-BCC9-9DB5-87391EFA5959}"/>
-          </ac:picMkLst>
-        </pc:picChg>
-        <pc:picChg chg="add del mod">
-          <ac:chgData name="Stuk, Gabriel" userId="0dcd8a03-429e-4c00-815d-e55b3b91aae4" providerId="ADAL" clId="{C10656D0-27FC-43F5-BB27-37079F55FF2F}" dt="2024-09-16T23:02:56.484" v="6954" actId="478"/>
-          <ac:picMkLst>
-            <pc:docMk/>
-            <pc:sldMk cId="2244053879" sldId="270"/>
-            <ac:picMk id="7" creationId="{4E145EA5-89B4-02EE-BFCE-59818D7E3056}"/>
-          </ac:picMkLst>
-        </pc:picChg>
-        <pc:picChg chg="add mod">
-          <ac:chgData name="Stuk, Gabriel" userId="0dcd8a03-429e-4c00-815d-e55b3b91aae4" providerId="ADAL" clId="{C10656D0-27FC-43F5-BB27-37079F55FF2F}" dt="2024-09-16T23:03:03.589" v="6957" actId="14100"/>
-          <ac:picMkLst>
-            <pc:docMk/>
-            <pc:sldMk cId="2244053879" sldId="270"/>
-            <ac:picMk id="9" creationId="{66539927-C5D5-BE1C-8C67-05BE71DA36C0}"/>
-          </ac:picMkLst>
-        </pc:picChg>
-      </pc:sldChg>
-      <pc:sldChg chg="addSp modSp new mod setBg">
-        <pc:chgData name="Stuk, Gabriel" userId="0dcd8a03-429e-4c00-815d-e55b3b91aae4" providerId="ADAL" clId="{C10656D0-27FC-43F5-BB27-37079F55FF2F}" dt="2024-09-16T23:10:47.695" v="7089" actId="1076"/>
-        <pc:sldMkLst>
-          <pc:docMk/>
-          <pc:sldMk cId="357538730" sldId="271"/>
-        </pc:sldMkLst>
-        <pc:spChg chg="mod">
-          <ac:chgData name="Stuk, Gabriel" userId="0dcd8a03-429e-4c00-815d-e55b3b91aae4" providerId="ADAL" clId="{C10656D0-27FC-43F5-BB27-37079F55FF2F}" dt="2024-09-16T23:10:47.695" v="7089" actId="1076"/>
-          <ac:spMkLst>
-            <pc:docMk/>
-            <pc:sldMk cId="357538730" sldId="271"/>
-            <ac:spMk id="2" creationId="{6FDADF95-821D-82B7-F9B0-D47A4DD659DF}"/>
-          </ac:spMkLst>
-        </pc:spChg>
-        <pc:spChg chg="mod">
-          <ac:chgData name="Stuk, Gabriel" userId="0dcd8a03-429e-4c00-815d-e55b3b91aae4" providerId="ADAL" clId="{C10656D0-27FC-43F5-BB27-37079F55FF2F}" dt="2024-09-16T23:10:47.695" v="7089" actId="1076"/>
-          <ac:spMkLst>
-            <pc:docMk/>
-            <pc:sldMk cId="357538730" sldId="271"/>
-            <ac:spMk id="3" creationId="{D9074FBE-14D5-B9A8-7726-82E643B99D6F}"/>
-          </ac:spMkLst>
-        </pc:spChg>
-        <pc:spChg chg="add">
-          <ac:chgData name="Stuk, Gabriel" userId="0dcd8a03-429e-4c00-815d-e55b3b91aae4" providerId="ADAL" clId="{C10656D0-27FC-43F5-BB27-37079F55FF2F}" dt="2024-09-16T23:09:32.537" v="7079" actId="26606"/>
-          <ac:spMkLst>
-            <pc:docMk/>
-            <pc:sldMk cId="357538730" sldId="271"/>
-            <ac:spMk id="10" creationId="{99B5B3C5-A599-465B-B2B9-866E8B2087CE}"/>
-          </ac:spMkLst>
-        </pc:spChg>
-        <pc:spChg chg="add">
-          <ac:chgData name="Stuk, Gabriel" userId="0dcd8a03-429e-4c00-815d-e55b3b91aae4" providerId="ADAL" clId="{C10656D0-27FC-43F5-BB27-37079F55FF2F}" dt="2024-09-16T23:09:32.537" v="7079" actId="26606"/>
-          <ac:spMkLst>
-            <pc:docMk/>
-            <pc:sldMk cId="357538730" sldId="271"/>
-            <ac:spMk id="12" creationId="{25C84982-7DD0-43B1-8A2D-BFA4DF1B4E60}"/>
-          </ac:spMkLst>
-        </pc:spChg>
-        <pc:spChg chg="add">
-          <ac:chgData name="Stuk, Gabriel" userId="0dcd8a03-429e-4c00-815d-e55b3b91aae4" providerId="ADAL" clId="{C10656D0-27FC-43F5-BB27-37079F55FF2F}" dt="2024-09-16T23:09:32.537" v="7079" actId="26606"/>
-          <ac:spMkLst>
-            <pc:docMk/>
-            <pc:sldMk cId="357538730" sldId="271"/>
-            <ac:spMk id="31" creationId="{C42CB9CB-DEA4-450C-99E4-96B2B31CAF37}"/>
-          </ac:spMkLst>
-        </pc:spChg>
-        <pc:spChg chg="add">
-          <ac:chgData name="Stuk, Gabriel" userId="0dcd8a03-429e-4c00-815d-e55b3b91aae4" providerId="ADAL" clId="{C10656D0-27FC-43F5-BB27-37079F55FF2F}" dt="2024-09-16T23:09:32.537" v="7079" actId="26606"/>
-          <ac:spMkLst>
-            <pc:docMk/>
-            <pc:sldMk cId="357538730" sldId="271"/>
-            <ac:spMk id="33" creationId="{4ED79745-3275-435B-BF35-89D6D8433F9A}"/>
-          </ac:spMkLst>
-        </pc:spChg>
-        <pc:spChg chg="add">
-          <ac:chgData name="Stuk, Gabriel" userId="0dcd8a03-429e-4c00-815d-e55b3b91aae4" providerId="ADAL" clId="{C10656D0-27FC-43F5-BB27-37079F55FF2F}" dt="2024-09-16T23:09:32.537" v="7079" actId="26606"/>
-          <ac:spMkLst>
-            <pc:docMk/>
-            <pc:sldMk cId="357538730" sldId="271"/>
-            <ac:spMk id="35" creationId="{C0338806-7531-497C-9306-02985DA1DA0D}"/>
-          </ac:spMkLst>
-        </pc:spChg>
-        <pc:spChg chg="add">
-          <ac:chgData name="Stuk, Gabriel" userId="0dcd8a03-429e-4c00-815d-e55b3b91aae4" providerId="ADAL" clId="{C10656D0-27FC-43F5-BB27-37079F55FF2F}" dt="2024-09-16T23:09:32.537" v="7079" actId="26606"/>
-          <ac:spMkLst>
-            <pc:docMk/>
-            <pc:sldMk cId="357538730" sldId="271"/>
-            <ac:spMk id="43" creationId="{3BED96EB-55C1-49EF-8F4B-640F8AE8C4AD}"/>
-          </ac:spMkLst>
-        </pc:spChg>
-        <pc:spChg chg="add">
-          <ac:chgData name="Stuk, Gabriel" userId="0dcd8a03-429e-4c00-815d-e55b3b91aae4" providerId="ADAL" clId="{C10656D0-27FC-43F5-BB27-37079F55FF2F}" dt="2024-09-16T23:09:32.537" v="7079" actId="26606"/>
-          <ac:spMkLst>
-            <pc:docMk/>
-            <pc:sldMk cId="357538730" sldId="271"/>
-            <ac:spMk id="47" creationId="{A18F111A-B7A1-484E-88DA-A8DB475117EA}"/>
-          </ac:spMkLst>
-        </pc:spChg>
-        <pc:grpChg chg="add">
-          <ac:chgData name="Stuk, Gabriel" userId="0dcd8a03-429e-4c00-815d-e55b3b91aae4" providerId="ADAL" clId="{C10656D0-27FC-43F5-BB27-37079F55FF2F}" dt="2024-09-16T23:09:32.537" v="7079" actId="26606"/>
-          <ac:grpSpMkLst>
-            <pc:docMk/>
-            <pc:sldMk cId="357538730" sldId="271"/>
-            <ac:grpSpMk id="14" creationId="{1D912E1C-3BBA-42F0-A3EE-FEC382E7230A}"/>
-          </ac:grpSpMkLst>
-        </pc:grpChg>
-        <pc:grpChg chg="add">
-          <ac:chgData name="Stuk, Gabriel" userId="0dcd8a03-429e-4c00-815d-e55b3b91aae4" providerId="ADAL" clId="{C10656D0-27FC-43F5-BB27-37079F55FF2F}" dt="2024-09-16T23:09:32.537" v="7079" actId="26606"/>
-          <ac:grpSpMkLst>
-            <pc:docMk/>
-            <pc:sldMk cId="357538730" sldId="271"/>
-            <ac:grpSpMk id="37" creationId="{B2905CD6-3E8A-4102-B417-B38458335DCD}"/>
-          </ac:grpSpMkLst>
-        </pc:grpChg>
-        <pc:picChg chg="add mod ord">
-          <ac:chgData name="Stuk, Gabriel" userId="0dcd8a03-429e-4c00-815d-e55b3b91aae4" providerId="ADAL" clId="{C10656D0-27FC-43F5-BB27-37079F55FF2F}" dt="2024-09-16T23:10:19.028" v="7088" actId="14100"/>
-          <ac:picMkLst>
-            <pc:docMk/>
-            <pc:sldMk cId="357538730" sldId="271"/>
-            <ac:picMk id="5" creationId="{59EE89D3-A5D7-923C-3B09-FE4E5C414755}"/>
-          </ac:picMkLst>
-        </pc:picChg>
-        <pc:picChg chg="add">
-          <ac:chgData name="Stuk, Gabriel" userId="0dcd8a03-429e-4c00-815d-e55b3b91aae4" providerId="ADAL" clId="{C10656D0-27FC-43F5-BB27-37079F55FF2F}" dt="2024-09-16T23:09:32.537" v="7079" actId="26606"/>
-          <ac:picMkLst>
-            <pc:docMk/>
-            <pc:sldMk cId="357538730" sldId="271"/>
-            <ac:picMk id="45" creationId="{36EF3032-02AC-4F0C-A448-AE9BE321EA9E}"/>
-          </ac:picMkLst>
-        </pc:picChg>
-        <pc:picChg chg="add">
-          <ac:chgData name="Stuk, Gabriel" userId="0dcd8a03-429e-4c00-815d-e55b3b91aae4" providerId="ADAL" clId="{C10656D0-27FC-43F5-BB27-37079F55FF2F}" dt="2024-09-16T23:09:32.537" v="7079" actId="26606"/>
-          <ac:picMkLst>
-            <pc:docMk/>
-            <pc:sldMk cId="357538730" sldId="271"/>
-            <ac:picMk id="49" creationId="{30849A0C-799D-4AD1-9EFD-5A2D3E795B6D}"/>
-          </ac:picMkLst>
-        </pc:picChg>
-      </pc:sldChg>
-      <pc:sldChg chg="addSp modSp new mod">
-        <pc:chgData name="Stuk, Gabriel" userId="0dcd8a03-429e-4c00-815d-e55b3b91aae4" providerId="ADAL" clId="{C10656D0-27FC-43F5-BB27-37079F55FF2F}" dt="2024-09-16T23:01:44.564" v="6945" actId="20577"/>
-        <pc:sldMkLst>
-          <pc:docMk/>
-          <pc:sldMk cId="3105824425" sldId="272"/>
-        </pc:sldMkLst>
-        <pc:spChg chg="mod">
-          <ac:chgData name="Stuk, Gabriel" userId="0dcd8a03-429e-4c00-815d-e55b3b91aae4" providerId="ADAL" clId="{C10656D0-27FC-43F5-BB27-37079F55FF2F}" dt="2024-09-16T22:57:24.862" v="6557" actId="20577"/>
-          <ac:spMkLst>
-            <pc:docMk/>
-            <pc:sldMk cId="3105824425" sldId="272"/>
-            <ac:spMk id="2" creationId="{CEE19FE8-6194-9C33-62BC-5C366F690EC2}"/>
-          </ac:spMkLst>
-        </pc:spChg>
-        <pc:spChg chg="mod">
-          <ac:chgData name="Stuk, Gabriel" userId="0dcd8a03-429e-4c00-815d-e55b3b91aae4" providerId="ADAL" clId="{C10656D0-27FC-43F5-BB27-37079F55FF2F}" dt="2024-09-16T23:01:44.564" v="6945" actId="20577"/>
-          <ac:spMkLst>
-            <pc:docMk/>
-            <pc:sldMk cId="3105824425" sldId="272"/>
-            <ac:spMk id="3" creationId="{BA6B51E8-A762-EAF4-7868-C5A49F727F76}"/>
-          </ac:spMkLst>
-        </pc:spChg>
-        <pc:picChg chg="add mod">
-          <ac:chgData name="Stuk, Gabriel" userId="0dcd8a03-429e-4c00-815d-e55b3b91aae4" providerId="ADAL" clId="{C10656D0-27FC-43F5-BB27-37079F55FF2F}" dt="2024-09-16T23:01:23.944" v="6889" actId="14100"/>
-          <ac:picMkLst>
-            <pc:docMk/>
-            <pc:sldMk cId="3105824425" sldId="272"/>
-            <ac:picMk id="5" creationId="{0D2A2C68-DD27-2AF6-6BE9-4E84F9B30701}"/>
-          </ac:picMkLst>
-        </pc:picChg>
-      </pc:sldChg>
-    </pc:docChg>
-  </pc:docChgLst>
-</pc:chgInfo>
-</file>
-
 <file path=ppt/notesMasters/notesMaster1.xml><?xml version="1.0" encoding="utf-8"?>
 <p:notesMaster xmlns:a="http://schemas.openxmlformats.org/drawingml/2006/main" xmlns:r="http://schemas.openxmlformats.org/officeDocument/2006/relationships" xmlns:p="http://schemas.openxmlformats.org/presentationml/2006/main">
   <p:cSld>
@@ -1976,7 +211,7 @@
           <a:p>
             <a:fld id="{DE915F60-F394-403A-B351-CA96273B0F06}" type="datetimeFigureOut">
               <a:rPr lang="en-US" smtClean="0"/>
-              <a:t>10/5/2024</a:t>
+              <a:t>11/9/2024</a:t>
             </a:fld>
             <a:endParaRPr lang="en-US"/>
           </a:p>
@@ -2564,7 +799,7 @@
           <a:p>
             <a:fld id="{C43A76A3-ADC8-4477-8FC1-B9DD55D84908}" type="datetime1">
               <a:rPr lang="en-US" smtClean="0"/>
-              <a:t>10/5/2024</a:t>
+              <a:t>11/9/2024</a:t>
             </a:fld>
             <a:endParaRPr lang="en-US"/>
           </a:p>
@@ -2762,7 +997,7 @@
           <a:p>
             <a:fld id="{D6762538-DC4D-4667-96E5-B3278DDF8B12}" type="datetime1">
               <a:rPr lang="en-US" smtClean="0"/>
-              <a:t>10/5/2024</a:t>
+              <a:t>11/9/2024</a:t>
             </a:fld>
             <a:endParaRPr lang="en-US"/>
           </a:p>
@@ -2970,7 +1205,7 @@
           <a:p>
             <a:fld id="{05880548-5C08-4BE3-B63E-F2BB63B0B00C}" type="datetime1">
               <a:rPr lang="en-US" smtClean="0"/>
-              <a:t>10/5/2024</a:t>
+              <a:t>11/9/2024</a:t>
             </a:fld>
             <a:endParaRPr lang="en-US"/>
           </a:p>
@@ -3168,7 +1403,7 @@
           <a:p>
             <a:fld id="{DE7F49BE-398D-479A-8A7E-5DDBCA61EDCB}" type="datetime1">
               <a:rPr lang="en-US" smtClean="0"/>
-              <a:t>10/5/2024</a:t>
+              <a:t>11/9/2024</a:t>
             </a:fld>
             <a:endParaRPr lang="en-US"/>
           </a:p>
@@ -3443,7 +1678,7 @@
           <a:p>
             <a:fld id="{CCD0C193-4974-4A1F-9C63-07D595E30D66}" type="datetime1">
               <a:rPr lang="en-US" smtClean="0"/>
-              <a:t>10/5/2024</a:t>
+              <a:t>11/9/2024</a:t>
             </a:fld>
             <a:endParaRPr lang="en-US"/>
           </a:p>
@@ -3708,7 +1943,7 @@
           <a:p>
             <a:fld id="{701AA87F-28D4-4BF0-B81F-877A89DFD5AC}" type="datetime1">
               <a:rPr lang="en-US" smtClean="0"/>
-              <a:t>10/5/2024</a:t>
+              <a:t>11/9/2024</a:t>
             </a:fld>
             <a:endParaRPr lang="en-US"/>
           </a:p>
@@ -4120,7 +2355,7 @@
           <a:p>
             <a:fld id="{A8A9F1F3-208B-49A3-B337-9C8ACEB3E0E1}" type="datetime1">
               <a:rPr lang="en-US" smtClean="0"/>
-              <a:t>10/5/2024</a:t>
+              <a:t>11/9/2024</a:t>
             </a:fld>
             <a:endParaRPr lang="en-US"/>
           </a:p>
@@ -4266,7 +2501,7 @@
           <a:p>
             <a:fld id="{27AF6CA6-7293-4AA2-A0E0-A3BF4416E786}" type="datetime1">
               <a:rPr lang="en-US" smtClean="0"/>
-              <a:t>10/5/2024</a:t>
+              <a:t>11/9/2024</a:t>
             </a:fld>
             <a:endParaRPr lang="en-US"/>
           </a:p>
@@ -4379,7 +2614,7 @@
           <a:p>
             <a:fld id="{98D87016-7BCD-46FB-8EE3-AB6C369108B4}" type="datetime1">
               <a:rPr lang="en-US" smtClean="0"/>
-              <a:t>10/5/2024</a:t>
+              <a:t>11/9/2024</a:t>
             </a:fld>
             <a:endParaRPr lang="en-US"/>
           </a:p>
@@ -4696,7 +2931,7 @@
           <a:p>
             <a:fld id="{A1547011-1FFC-4EF8-9A2E-53B4AD2ADBD4}" type="datetime1">
               <a:rPr lang="en-US" smtClean="0"/>
-              <a:t>10/5/2024</a:t>
+              <a:t>11/9/2024</a:t>
             </a:fld>
             <a:endParaRPr lang="en-US"/>
           </a:p>
@@ -4989,7 +3224,7 @@
           <a:p>
             <a:fld id="{9562EB47-45B4-4EF5-A743-B4885DD2F060}" type="datetime1">
               <a:rPr lang="en-US" smtClean="0"/>
-              <a:t>10/5/2024</a:t>
+              <a:t>11/9/2024</a:t>
             </a:fld>
             <a:endParaRPr lang="en-US"/>
           </a:p>
@@ -6374,7 +4609,7 @@
           <a:p>
             <a:fld id="{4A8D24A4-5FEC-4062-8995-EB21925B3B40}" type="datetime1">
               <a:rPr lang="en-US" smtClean="0"/>
-              <a:t>10/5/2024</a:t>
+              <a:t>11/9/2024</a:t>
             </a:fld>
             <a:endParaRPr lang="en-US" sz="1000"/>
           </a:p>
@@ -10700,15 +8935,20 @@
           <p:nvPr/>
         </p:nvPicPr>
         <p:blipFill>
-          <a:blip r:embed="rId2"/>
-          <a:stretch>
-            <a:fillRect/>
-          </a:stretch>
+          <a:blip r:embed="rId2">
+            <a:extLst>
+              <a:ext uri="{28A0092B-C50C-407E-A947-70E740481C1C}">
+                <a14:useLocalDpi xmlns:a14="http://schemas.microsoft.com/office/drawing/2010/main" val="0"/>
+              </a:ext>
+            </a:extLst>
+          </a:blip>
+          <a:srcRect r="20222" b="4400"/>
+          <a:stretch/>
         </p:blipFill>
         <p:spPr>
           <a:xfrm>
-            <a:off x="6033176" y="0"/>
-            <a:ext cx="6158824" cy="6858000"/>
+            <a:off x="7717537" y="0"/>
+            <a:ext cx="4474464" cy="6884017"/>
           </a:xfrm>
           <a:prstGeom prst="rect">
             <a:avLst/>

</xml_diff>

<commit_message>
Changed the pptx (again) and redid template 4
</commit_message>
<xml_diff>
--- a/PowerPoints/Lesson 4-Objects and Subsystems.pptx
+++ b/PowerPoints/Lesson 4-Objects and Subsystems.pptx
@@ -127,6 +127,14 @@
     </p:ext>
   </p:extLst>
 </p:presentation>
+</file>
+
+<file path=ppt/revisionInfo.xml><?xml version="1.0" encoding="utf-8"?>
+<p1510:revInfo xmlns:a="http://schemas.openxmlformats.org/drawingml/2006/main" xmlns:r="http://schemas.openxmlformats.org/officeDocument/2006/relationships" xmlns:p1510="http://schemas.microsoft.com/office/powerpoint/2015/10/main">
+  <p1510:revLst>
+    <p1510:client id="{C10656D0-27FC-43F5-BB27-37079F55FF2F}" v="1" dt="2024-11-09T15:36:48.917"/>
+  </p1510:revLst>
+</p1510:revInfo>
 </file>
 
 <file path=ppt/notesMasters/notesMaster1.xml><?xml version="1.0" encoding="utf-8"?>
@@ -8942,7 +8950,7 @@
               </a:ext>
             </a:extLst>
           </a:blip>
-          <a:srcRect r="20222" b="4400"/>
+          <a:srcRect l="7" r="7"/>
           <a:stretch/>
         </p:blipFill>
         <p:spPr>
@@ -11211,14 +11219,43 @@
         </p:nvPicPr>
         <p:blipFill>
           <a:blip r:embed="rId7"/>
+          <a:srcRect b="50757"/>
+          <a:stretch/>
+        </p:blipFill>
+        <p:spPr>
+          <a:xfrm>
+            <a:off x="3998737" y="734543"/>
+            <a:ext cx="7950013" cy="2387600"/>
+          </a:xfrm>
+          <a:prstGeom prst="rect">
+            <a:avLst/>
+          </a:prstGeom>
+        </p:spPr>
+      </p:pic>
+      <p:pic>
+        <p:nvPicPr>
+          <p:cNvPr id="5" name="Picture 4">
+            <a:extLst>
+              <a:ext uri="{FF2B5EF4-FFF2-40B4-BE49-F238E27FC236}">
+                <a16:creationId xmlns:a16="http://schemas.microsoft.com/office/drawing/2014/main" id="{81199CC2-A293-A157-9A46-C2A540AB5E79}"/>
+              </a:ext>
+            </a:extLst>
+          </p:cNvPr>
+          <p:cNvPicPr>
+            <a:picLocks noChangeAspect="1"/>
+          </p:cNvPicPr>
+          <p:nvPr/>
+        </p:nvPicPr>
+        <p:blipFill>
+          <a:blip r:embed="rId8"/>
           <a:stretch>
             <a:fillRect/>
           </a:stretch>
         </p:blipFill>
         <p:spPr>
           <a:xfrm>
-            <a:off x="3998737" y="734542"/>
-            <a:ext cx="7950013" cy="4848635"/>
+            <a:off x="997695" y="4962812"/>
+            <a:ext cx="10679015" cy="1171739"/>
           </a:xfrm>
           <a:prstGeom prst="rect">
             <a:avLst/>

</xml_diff>